<commit_message>
Update CeTI Course 2
</commit_message>
<xml_diff>
--- a/CeTI/b0_intro/B1_2_CeTI_Photodetection.pptx
+++ b/CeTI/b0_intro/B1_2_CeTI_Photodetection.pptx
@@ -5,7 +5,7 @@
     <p:sldMasterId id="2147483711" r:id="rId1"/>
   </p:sldMasterIdLst>
   <p:notesMasterIdLst>
-    <p:notesMasterId r:id="rId14"/>
+    <p:notesMasterId r:id="rId21"/>
   </p:notesMasterIdLst>
   <p:sldIdLst>
     <p:sldId id="267" r:id="rId2"/>
@@ -17,9 +17,16 @@
     <p:sldId id="282" r:id="rId8"/>
     <p:sldId id="286" r:id="rId9"/>
     <p:sldId id="283" r:id="rId10"/>
-    <p:sldId id="284" r:id="rId11"/>
-    <p:sldId id="288" r:id="rId12"/>
-    <p:sldId id="287" r:id="rId13"/>
+    <p:sldId id="295" r:id="rId11"/>
+    <p:sldId id="284" r:id="rId12"/>
+    <p:sldId id="288" r:id="rId13"/>
+    <p:sldId id="287" r:id="rId14"/>
+    <p:sldId id="291" r:id="rId15"/>
+    <p:sldId id="290" r:id="rId16"/>
+    <p:sldId id="289" r:id="rId17"/>
+    <p:sldId id="292" r:id="rId18"/>
+    <p:sldId id="293" r:id="rId19"/>
+    <p:sldId id="294" r:id="rId20"/>
   </p:sldIdLst>
   <p:sldSz cx="12192000" cy="6858000"/>
   <p:notesSz cx="6858000" cy="9144000"/>
@@ -219,7 +226,7 @@
           <a:p>
             <a:fld id="{729C724E-499D-43AC-8699-CF969D2466FC}" type="datetimeFigureOut">
               <a:rPr lang="fr-FR" smtClean="0"/>
-              <a:t>13/10/2023</a:t>
+              <a:t>17/10/2023</a:t>
             </a:fld>
             <a:endParaRPr lang="fr-FR"/>
           </a:p>
@@ -642,7 +649,7 @@
           <a:p>
             <a:fld id="{02AC24A9-CCB6-4F8D-B8DB-C2F3692CFA5A}" type="datetimeFigureOut">
               <a:rPr lang="en-US" smtClean="0"/>
-              <a:t>10/13/2023</a:t>
+              <a:t>10/17/2023</a:t>
             </a:fld>
             <a:endParaRPr lang="en-US" dirty="0"/>
           </a:p>
@@ -1012,7 +1019,7 @@
           <a:p>
             <a:fld id="{02AC24A9-CCB6-4F8D-B8DB-C2F3692CFA5A}" type="datetimeFigureOut">
               <a:rPr lang="en-US" smtClean="0"/>
-              <a:t>10/13/2023</a:t>
+              <a:t>10/17/2023</a:t>
             </a:fld>
             <a:endParaRPr lang="en-US"/>
           </a:p>
@@ -1221,7 +1228,7 @@
           <a:p>
             <a:fld id="{02AC24A9-CCB6-4F8D-B8DB-C2F3692CFA5A}" type="datetimeFigureOut">
               <a:rPr lang="en-US" smtClean="0"/>
-              <a:t>10/13/2023</a:t>
+              <a:t>10/17/2023</a:t>
             </a:fld>
             <a:endParaRPr lang="en-US"/>
           </a:p>
@@ -1691,7 +1698,7 @@
           <a:p>
             <a:fld id="{02AC24A9-CCB6-4F8D-B8DB-C2F3692CFA5A}" type="datetimeFigureOut">
               <a:rPr lang="en-US" smtClean="0"/>
-              <a:t>10/13/2023</a:t>
+              <a:t>10/17/2023</a:t>
             </a:fld>
             <a:endParaRPr lang="en-US"/>
           </a:p>
@@ -2145,7 +2152,7 @@
           <a:p>
             <a:fld id="{02AC24A9-CCB6-4F8D-B8DB-C2F3692CFA5A}" type="datetimeFigureOut">
               <a:rPr lang="en-US" smtClean="0"/>
-              <a:t>10/13/2023</a:t>
+              <a:t>10/17/2023</a:t>
             </a:fld>
             <a:endParaRPr lang="en-US"/>
           </a:p>
@@ -2677,7 +2684,7 @@
           <a:p>
             <a:fld id="{02AC24A9-CCB6-4F8D-B8DB-C2F3692CFA5A}" type="datetimeFigureOut">
               <a:rPr lang="en-US" smtClean="0"/>
-              <a:t>10/13/2023</a:t>
+              <a:t>10/17/2023</a:t>
             </a:fld>
             <a:endParaRPr lang="en-US"/>
           </a:p>
@@ -3376,7 +3383,7 @@
           <a:p>
             <a:fld id="{02AC24A9-CCB6-4F8D-B8DB-C2F3692CFA5A}" type="datetimeFigureOut">
               <a:rPr lang="en-US" smtClean="0"/>
-              <a:t>10/13/2023</a:t>
+              <a:t>10/17/2023</a:t>
             </a:fld>
             <a:endParaRPr lang="en-US"/>
           </a:p>
@@ -3705,7 +3712,7 @@
           <a:p>
             <a:fld id="{02AC24A9-CCB6-4F8D-B8DB-C2F3692CFA5A}" type="datetimeFigureOut">
               <a:rPr lang="en-US" smtClean="0"/>
-              <a:t>10/13/2023</a:t>
+              <a:t>10/17/2023</a:t>
             </a:fld>
             <a:endParaRPr lang="en-US"/>
           </a:p>
@@ -3818,7 +3825,7 @@
           <a:p>
             <a:fld id="{02AC24A9-CCB6-4F8D-B8DB-C2F3692CFA5A}" type="datetimeFigureOut">
               <a:rPr lang="en-US" smtClean="0"/>
-              <a:t>10/13/2023</a:t>
+              <a:t>10/17/2023</a:t>
             </a:fld>
             <a:endParaRPr lang="en-US"/>
           </a:p>
@@ -4313,7 +4320,7 @@
           <a:p>
             <a:fld id="{02AC24A9-CCB6-4F8D-B8DB-C2F3692CFA5A}" type="datetimeFigureOut">
               <a:rPr lang="en-US" smtClean="0"/>
-              <a:t>10/13/2023</a:t>
+              <a:t>10/17/2023</a:t>
             </a:fld>
             <a:endParaRPr lang="en-US" dirty="0"/>
           </a:p>
@@ -4790,7 +4797,7 @@
           <a:p>
             <a:fld id="{02AC24A9-CCB6-4F8D-B8DB-C2F3692CFA5A}" type="datetimeFigureOut">
               <a:rPr lang="en-US" smtClean="0"/>
-              <a:t>10/13/2023</a:t>
+              <a:t>10/17/2023</a:t>
             </a:fld>
             <a:endParaRPr lang="en-US"/>
           </a:p>
@@ -5033,7 +5040,7 @@
           <a:p>
             <a:fld id="{02AC24A9-CCB6-4F8D-B8DB-C2F3692CFA5A}" type="datetimeFigureOut">
               <a:rPr lang="en-US" smtClean="0"/>
-              <a:t>10/13/2023</a:t>
+              <a:t>10/17/2023</a:t>
             </a:fld>
             <a:endParaRPr lang="en-US"/>
           </a:p>
@@ -6026,17 +6033,22 @@
           <a:p>
             <a:r>
               <a:rPr lang="fr-FR" dirty="0"/>
-              <a:t>Etude expérimentale</a:t>
-            </a:r>
+              <a:t>Montage de </a:t>
+            </a:r>
+            <a:r>
+              <a:rPr lang="fr-FR" dirty="0" err="1"/>
+              <a:t>photodétection</a:t>
+            </a:r>
+            <a:endParaRPr lang="fr-FR" dirty="0"/>
           </a:p>
         </p:txBody>
       </p:sp>
       <p:pic>
         <p:nvPicPr>
-          <p:cNvPr id="4" name="Image 3">
-            <a:extLst>
-              <a:ext uri="{FF2B5EF4-FFF2-40B4-BE49-F238E27FC236}">
-                <a16:creationId xmlns:a16="http://schemas.microsoft.com/office/drawing/2014/main" id="{EF31D6FF-1C88-7FBE-BD31-314EA3DAE0D0}"/>
+          <p:cNvPr id="3" name="Image 2">
+            <a:extLst>
+              <a:ext uri="{FF2B5EF4-FFF2-40B4-BE49-F238E27FC236}">
+                <a16:creationId xmlns:a16="http://schemas.microsoft.com/office/drawing/2014/main" id="{1C2F9347-6A36-4DFC-314F-983DA0C470C5}"/>
               </a:ext>
             </a:extLst>
           </p:cNvPr>
@@ -6053,20 +6065,80 @@
         </p:blipFill>
         <p:spPr>
           <a:xfrm>
-            <a:off x="584506" y="2185035"/>
-            <a:ext cx="5753100" cy="4124325"/>
+            <a:off x="7295643" y="2514833"/>
+            <a:ext cx="2294795" cy="3465746"/>
           </a:xfrm>
           <a:prstGeom prst="rect">
             <a:avLst/>
           </a:prstGeom>
         </p:spPr>
       </p:pic>
+      <p:sp>
+        <p:nvSpPr>
+          <p:cNvPr id="5" name="ZoneTexte 4">
+            <a:extLst>
+              <a:ext uri="{FF2B5EF4-FFF2-40B4-BE49-F238E27FC236}">
+                <a16:creationId xmlns:a16="http://schemas.microsoft.com/office/drawing/2014/main" id="{281F139D-B54B-7C7A-6CB5-AF27F925A3C2}"/>
+              </a:ext>
+            </a:extLst>
+          </p:cNvPr>
+          <p:cNvSpPr txBox="1"/>
+          <p:nvPr/>
+        </p:nvSpPr>
+        <p:spPr>
+          <a:xfrm>
+            <a:off x="9282896" y="5410110"/>
+            <a:ext cx="2617048" cy="461665"/>
+          </a:xfrm>
+          <a:prstGeom prst="rect">
+            <a:avLst/>
+          </a:prstGeom>
+          <a:noFill/>
+        </p:spPr>
+        <p:txBody>
+          <a:bodyPr wrap="square">
+            <a:spAutoFit/>
+          </a:bodyPr>
+          <a:lstStyle/>
+          <a:p>
+            <a:r>
+              <a:rPr lang="fr-FR" sz="2400" b="1" dirty="0"/>
+              <a:t>V</a:t>
+            </a:r>
+            <a:r>
+              <a:rPr lang="fr-FR" sz="2400" b="1" baseline="-25000" dirty="0"/>
+              <a:t>S</a:t>
+            </a:r>
+            <a:r>
+              <a:rPr lang="fr-FR" sz="2400" b="1" dirty="0"/>
+              <a:t> = R</a:t>
+            </a:r>
+            <a:r>
+              <a:rPr lang="fr-FR" sz="2400" b="1" baseline="-25000" dirty="0"/>
+              <a:t>PHD</a:t>
+            </a:r>
+            <a:r>
+              <a:rPr lang="fr-FR" sz="2400" b="1" dirty="0"/>
+              <a:t> . </a:t>
+            </a:r>
+            <a:r>
+              <a:rPr lang="fr-FR" sz="2400" b="1" dirty="0" err="1"/>
+              <a:t>I</a:t>
+            </a:r>
+            <a:r>
+              <a:rPr lang="fr-FR" sz="2400" b="1" baseline="-25000" dirty="0" err="1"/>
+              <a:t>photo</a:t>
+            </a:r>
+            <a:endParaRPr lang="fr-FR" sz="2400" b="1" baseline="-25000" dirty="0"/>
+          </a:p>
+        </p:txBody>
+      </p:sp>
       <p:pic>
         <p:nvPicPr>
-          <p:cNvPr id="8" name="Image 7">
-            <a:extLst>
-              <a:ext uri="{FF2B5EF4-FFF2-40B4-BE49-F238E27FC236}">
-                <a16:creationId xmlns:a16="http://schemas.microsoft.com/office/drawing/2014/main" id="{DB05CAD6-6D3E-590A-FCDF-1D26DD2396F1}"/>
+          <p:cNvPr id="6" name="Image 5">
+            <a:extLst>
+              <a:ext uri="{FF2B5EF4-FFF2-40B4-BE49-F238E27FC236}">
+                <a16:creationId xmlns:a16="http://schemas.microsoft.com/office/drawing/2014/main" id="{56F5300C-80EA-8D56-BEB2-0E236C673058}"/>
               </a:ext>
             </a:extLst>
           </p:cNvPr>
@@ -6083,20 +6155,350 @@
         </p:blipFill>
         <p:spPr>
           <a:xfrm>
-            <a:off x="7295643" y="2514833"/>
-            <a:ext cx="2294795" cy="3465746"/>
+            <a:off x="1118897" y="5029212"/>
+            <a:ext cx="2219567" cy="1685126"/>
           </a:xfrm>
           <a:prstGeom prst="rect">
             <a:avLst/>
           </a:prstGeom>
         </p:spPr>
       </p:pic>
-      <p:sp>
-        <p:nvSpPr>
-          <p:cNvPr id="9" name="ZoneTexte 8">
-            <a:extLst>
-              <a:ext uri="{FF2B5EF4-FFF2-40B4-BE49-F238E27FC236}">
-                <a16:creationId xmlns:a16="http://schemas.microsoft.com/office/drawing/2014/main" id="{AEA311CB-56A2-F3FB-E970-A713C2F95C49}"/>
+      <p:pic>
+        <p:nvPicPr>
+          <p:cNvPr id="11" name="Image 10">
+            <a:extLst>
+              <a:ext uri="{FF2B5EF4-FFF2-40B4-BE49-F238E27FC236}">
+                <a16:creationId xmlns:a16="http://schemas.microsoft.com/office/drawing/2014/main" id="{A80E7F5E-3491-DD54-A447-218B0553A495}"/>
+              </a:ext>
+            </a:extLst>
+          </p:cNvPr>
+          <p:cNvPicPr>
+            <a:picLocks noChangeAspect="1"/>
+          </p:cNvPicPr>
+          <p:nvPr/>
+        </p:nvPicPr>
+        <p:blipFill>
+          <a:blip r:embed="rId5"/>
+          <a:stretch>
+            <a:fillRect/>
+          </a:stretch>
+        </p:blipFill>
+        <p:spPr>
+          <a:xfrm>
+            <a:off x="549706" y="2089944"/>
+            <a:ext cx="6524359" cy="3039841"/>
+          </a:xfrm>
+          <a:prstGeom prst="rect">
+            <a:avLst/>
+          </a:prstGeom>
+        </p:spPr>
+      </p:pic>
+      <p:sp>
+        <p:nvSpPr>
+          <p:cNvPr id="12" name="Rectangle 11">
+            <a:extLst>
+              <a:ext uri="{FF2B5EF4-FFF2-40B4-BE49-F238E27FC236}">
+                <a16:creationId xmlns:a16="http://schemas.microsoft.com/office/drawing/2014/main" id="{4D45C889-C661-58C3-BFFA-E496108B4DDE}"/>
+              </a:ext>
+            </a:extLst>
+          </p:cNvPr>
+          <p:cNvSpPr/>
+          <p:nvPr/>
+        </p:nvSpPr>
+        <p:spPr>
+          <a:xfrm>
+            <a:off x="6006478" y="2186872"/>
+            <a:ext cx="1481560" cy="1088764"/>
+          </a:xfrm>
+          <a:prstGeom prst="rect">
+            <a:avLst/>
+          </a:prstGeom>
+          <a:solidFill>
+            <a:schemeClr val="bg1"/>
+          </a:solidFill>
+          <a:ln>
+            <a:noFill/>
+          </a:ln>
+        </p:spPr>
+        <p:style>
+          <a:lnRef idx="2">
+            <a:schemeClr val="accent1">
+              <a:shade val="15000"/>
+            </a:schemeClr>
+          </a:lnRef>
+          <a:fillRef idx="1">
+            <a:schemeClr val="accent1"/>
+          </a:fillRef>
+          <a:effectRef idx="0">
+            <a:schemeClr val="accent1"/>
+          </a:effectRef>
+          <a:fontRef idx="minor">
+            <a:schemeClr val="lt1"/>
+          </a:fontRef>
+        </p:style>
+        <p:txBody>
+          <a:bodyPr rtlCol="0" anchor="ctr"/>
+          <a:lstStyle/>
+          <a:p>
+            <a:pPr algn="ctr"/>
+            <a:endParaRPr lang="fr-FR">
+              <a:solidFill>
+                <a:schemeClr val="bg1"/>
+              </a:solidFill>
+            </a:endParaRPr>
+          </a:p>
+        </p:txBody>
+      </p:sp>
+      <p:sp>
+        <p:nvSpPr>
+          <p:cNvPr id="13" name="Rectangle 12">
+            <a:extLst>
+              <a:ext uri="{FF2B5EF4-FFF2-40B4-BE49-F238E27FC236}">
+                <a16:creationId xmlns:a16="http://schemas.microsoft.com/office/drawing/2014/main" id="{59D24501-07DC-9B8F-BEE2-E57E41221B63}"/>
+              </a:ext>
+            </a:extLst>
+          </p:cNvPr>
+          <p:cNvSpPr/>
+          <p:nvPr/>
+        </p:nvSpPr>
+        <p:spPr>
+          <a:xfrm>
+            <a:off x="6006478" y="4315853"/>
+            <a:ext cx="1481560" cy="1088764"/>
+          </a:xfrm>
+          <a:prstGeom prst="rect">
+            <a:avLst/>
+          </a:prstGeom>
+          <a:solidFill>
+            <a:schemeClr val="bg1"/>
+          </a:solidFill>
+          <a:ln>
+            <a:noFill/>
+          </a:ln>
+        </p:spPr>
+        <p:style>
+          <a:lnRef idx="2">
+            <a:schemeClr val="accent1">
+              <a:shade val="15000"/>
+            </a:schemeClr>
+          </a:lnRef>
+          <a:fillRef idx="1">
+            <a:schemeClr val="accent1"/>
+          </a:fillRef>
+          <a:effectRef idx="0">
+            <a:schemeClr val="accent1"/>
+          </a:effectRef>
+          <a:fontRef idx="minor">
+            <a:schemeClr val="lt1"/>
+          </a:fontRef>
+        </p:style>
+        <p:txBody>
+          <a:bodyPr rtlCol="0" anchor="ctr"/>
+          <a:lstStyle/>
+          <a:p>
+            <a:pPr algn="ctr"/>
+            <a:endParaRPr lang="fr-FR">
+              <a:solidFill>
+                <a:schemeClr val="bg1"/>
+              </a:solidFill>
+            </a:endParaRPr>
+          </a:p>
+        </p:txBody>
+      </p:sp>
+      <p:cxnSp>
+        <p:nvCxnSpPr>
+          <p:cNvPr id="8" name="Connecteur droit 7">
+            <a:extLst>
+              <a:ext uri="{FF2B5EF4-FFF2-40B4-BE49-F238E27FC236}">
+                <a16:creationId xmlns:a16="http://schemas.microsoft.com/office/drawing/2014/main" id="{78C9C485-2033-2105-8303-3D4A9E4A0F72}"/>
+              </a:ext>
+            </a:extLst>
+          </p:cNvPr>
+          <p:cNvCxnSpPr>
+            <a:cxnSpLocks/>
+          </p:cNvCxnSpPr>
+          <p:nvPr/>
+        </p:nvCxnSpPr>
+        <p:spPr>
+          <a:xfrm>
+            <a:off x="2685595" y="3381861"/>
+            <a:ext cx="1506263" cy="1839068"/>
+          </a:xfrm>
+          <a:prstGeom prst="line">
+            <a:avLst/>
+          </a:prstGeom>
+          <a:ln w="57150">
+            <a:prstDash val="sysDash"/>
+          </a:ln>
+        </p:spPr>
+        <p:style>
+          <a:lnRef idx="1">
+            <a:schemeClr val="accent1"/>
+          </a:lnRef>
+          <a:fillRef idx="0">
+            <a:schemeClr val="accent1"/>
+          </a:fillRef>
+          <a:effectRef idx="0">
+            <a:schemeClr val="accent1"/>
+          </a:effectRef>
+          <a:fontRef idx="minor">
+            <a:schemeClr val="tx1"/>
+          </a:fontRef>
+        </p:style>
+      </p:cxnSp>
+      <p:sp>
+        <p:nvSpPr>
+          <p:cNvPr id="10" name="Ellipse 9">
+            <a:extLst>
+              <a:ext uri="{FF2B5EF4-FFF2-40B4-BE49-F238E27FC236}">
+                <a16:creationId xmlns:a16="http://schemas.microsoft.com/office/drawing/2014/main" id="{F24CBD64-90CE-DFB1-86FA-1191618B4004}"/>
+              </a:ext>
+            </a:extLst>
+          </p:cNvPr>
+          <p:cNvSpPr/>
+          <p:nvPr/>
+        </p:nvSpPr>
+        <p:spPr>
+          <a:xfrm>
+            <a:off x="3190979" y="3985889"/>
+            <a:ext cx="108155" cy="139877"/>
+          </a:xfrm>
+          <a:prstGeom prst="ellipse">
+            <a:avLst/>
+          </a:prstGeom>
+          <a:solidFill>
+            <a:srgbClr val="FFFF00"/>
+          </a:solidFill>
+        </p:spPr>
+        <p:style>
+          <a:lnRef idx="2">
+            <a:schemeClr val="accent1">
+              <a:shade val="15000"/>
+            </a:schemeClr>
+          </a:lnRef>
+          <a:fillRef idx="1">
+            <a:schemeClr val="accent1"/>
+          </a:fillRef>
+          <a:effectRef idx="0">
+            <a:schemeClr val="accent1"/>
+          </a:effectRef>
+          <a:fontRef idx="minor">
+            <a:schemeClr val="lt1"/>
+          </a:fontRef>
+        </p:style>
+        <p:txBody>
+          <a:bodyPr rtlCol="0" anchor="ctr"/>
+          <a:lstStyle/>
+          <a:p>
+            <a:pPr algn="ctr"/>
+            <a:endParaRPr lang="fr-FR"/>
+          </a:p>
+        </p:txBody>
+      </p:sp>
+      <p:sp>
+        <p:nvSpPr>
+          <p:cNvPr id="14" name="Ellipse 13">
+            <a:extLst>
+              <a:ext uri="{FF2B5EF4-FFF2-40B4-BE49-F238E27FC236}">
+                <a16:creationId xmlns:a16="http://schemas.microsoft.com/office/drawing/2014/main" id="{83B44C3E-5E1E-D02B-90E8-79958DC2C4E6}"/>
+              </a:ext>
+            </a:extLst>
+          </p:cNvPr>
+          <p:cNvSpPr/>
+          <p:nvPr/>
+        </p:nvSpPr>
+        <p:spPr>
+          <a:xfrm>
+            <a:off x="3651311" y="4557125"/>
+            <a:ext cx="108155" cy="139877"/>
+          </a:xfrm>
+          <a:prstGeom prst="ellipse">
+            <a:avLst/>
+          </a:prstGeom>
+          <a:solidFill>
+            <a:srgbClr val="FFFF00"/>
+          </a:solidFill>
+        </p:spPr>
+        <p:style>
+          <a:lnRef idx="2">
+            <a:schemeClr val="accent1">
+              <a:shade val="15000"/>
+            </a:schemeClr>
+          </a:lnRef>
+          <a:fillRef idx="1">
+            <a:schemeClr val="accent1"/>
+          </a:fillRef>
+          <a:effectRef idx="0">
+            <a:schemeClr val="accent1"/>
+          </a:effectRef>
+          <a:fontRef idx="minor">
+            <a:schemeClr val="lt1"/>
+          </a:fontRef>
+        </p:style>
+        <p:txBody>
+          <a:bodyPr rtlCol="0" anchor="ctr"/>
+          <a:lstStyle/>
+          <a:p>
+            <a:pPr algn="ctr"/>
+            <a:endParaRPr lang="fr-FR"/>
+          </a:p>
+        </p:txBody>
+      </p:sp>
+      <p:sp>
+        <p:nvSpPr>
+          <p:cNvPr id="15" name="Ellipse 14">
+            <a:extLst>
+              <a:ext uri="{FF2B5EF4-FFF2-40B4-BE49-F238E27FC236}">
+                <a16:creationId xmlns:a16="http://schemas.microsoft.com/office/drawing/2014/main" id="{7EA4F1BA-DEF0-1A17-8BBA-D98612DA7586}"/>
+              </a:ext>
+            </a:extLst>
+          </p:cNvPr>
+          <p:cNvSpPr/>
+          <p:nvPr/>
+        </p:nvSpPr>
+        <p:spPr>
+          <a:xfrm>
+            <a:off x="2830318" y="3539925"/>
+            <a:ext cx="108155" cy="139877"/>
+          </a:xfrm>
+          <a:prstGeom prst="ellipse">
+            <a:avLst/>
+          </a:prstGeom>
+          <a:solidFill>
+            <a:srgbClr val="FFFF00"/>
+          </a:solidFill>
+        </p:spPr>
+        <p:style>
+          <a:lnRef idx="2">
+            <a:schemeClr val="accent1">
+              <a:shade val="15000"/>
+            </a:schemeClr>
+          </a:lnRef>
+          <a:fillRef idx="1">
+            <a:schemeClr val="accent1"/>
+          </a:fillRef>
+          <a:effectRef idx="0">
+            <a:schemeClr val="accent1"/>
+          </a:effectRef>
+          <a:fontRef idx="minor">
+            <a:schemeClr val="lt1"/>
+          </a:fontRef>
+        </p:style>
+        <p:txBody>
+          <a:bodyPr rtlCol="0" anchor="ctr"/>
+          <a:lstStyle/>
+          <a:p>
+            <a:pPr algn="ctr"/>
+            <a:endParaRPr lang="fr-FR"/>
+          </a:p>
+        </p:txBody>
+      </p:sp>
+      <p:sp>
+        <p:nvSpPr>
+          <p:cNvPr id="17" name="ZoneTexte 16">
+            <a:extLst>
+              <a:ext uri="{FF2B5EF4-FFF2-40B4-BE49-F238E27FC236}">
+                <a16:creationId xmlns:a16="http://schemas.microsoft.com/office/drawing/2014/main" id="{EEC7C10D-7D55-AC26-4887-6A565105EC8B}"/>
               </a:ext>
             </a:extLst>
           </p:cNvPr>
@@ -6105,8 +6507,8 @@
         </p:nvSpPr>
         <p:spPr>
           <a:xfrm>
-            <a:off x="9282896" y="5410110"/>
-            <a:ext cx="2617048" cy="461665"/>
+            <a:off x="4650657" y="6308540"/>
+            <a:ext cx="4488013" cy="369332"/>
           </a:xfrm>
           <a:prstGeom prst="rect">
             <a:avLst/>
@@ -6114,47 +6516,26 @@
           <a:noFill/>
         </p:spPr>
         <p:txBody>
-          <a:bodyPr wrap="square">
+          <a:bodyPr wrap="square" rtlCol="0">
             <a:spAutoFit/>
           </a:bodyPr>
           <a:lstStyle/>
           <a:p>
             <a:r>
-              <a:rPr lang="fr-FR" sz="2400" b="1" dirty="0"/>
-              <a:t>V</a:t>
-            </a:r>
-            <a:r>
-              <a:rPr lang="fr-FR" sz="2400" b="1" baseline="-25000" dirty="0"/>
-              <a:t>S</a:t>
-            </a:r>
-            <a:r>
-              <a:rPr lang="fr-FR" sz="2400" b="1" dirty="0"/>
-              <a:t> = R</a:t>
-            </a:r>
-            <a:r>
-              <a:rPr lang="fr-FR" sz="2400" b="1" baseline="-25000" dirty="0"/>
-              <a:t>PHD</a:t>
-            </a:r>
-            <a:r>
-              <a:rPr lang="fr-FR" sz="2400" b="1" dirty="0"/>
-              <a:t> . </a:t>
-            </a:r>
-            <a:r>
-              <a:rPr lang="fr-FR" sz="2400" b="1" dirty="0" err="1"/>
-              <a:t>I</a:t>
-            </a:r>
-            <a:r>
-              <a:rPr lang="fr-FR" sz="2400" b="1" baseline="-25000" dirty="0" err="1"/>
-              <a:t>photo</a:t>
-            </a:r>
-            <a:endParaRPr lang="fr-FR" sz="2400" b="1" baseline="-25000" dirty="0"/>
+              <a:rPr lang="fr-FR" dirty="0">
+                <a:solidFill>
+                  <a:srgbClr val="FF0000"/>
+                </a:solidFill>
+              </a:rPr>
+              <a:t>Tension de polarisation non constante</a:t>
+            </a:r>
           </a:p>
         </p:txBody>
       </p:sp>
     </p:spTree>
     <p:extLst>
       <p:ext uri="{BB962C8B-B14F-4D97-AF65-F5344CB8AC3E}">
-        <p14:creationId xmlns:p14="http://schemas.microsoft.com/office/powerpoint/2010/main" val="1332532123"/>
+        <p14:creationId xmlns:p14="http://schemas.microsoft.com/office/powerpoint/2010/main" val="3941104791"/>
       </p:ext>
     </p:extLst>
   </p:cSld>
@@ -6234,7 +6615,7 @@
           <a:p>
             <a:r>
               <a:rPr lang="fr-FR" dirty="0"/>
-              <a:t>Modélisation</a:t>
+              <a:t>Etude expérimentale</a:t>
             </a:r>
           </a:p>
         </p:txBody>
@@ -6271,10 +6652,10 @@
       </p:pic>
       <p:pic>
         <p:nvPicPr>
-          <p:cNvPr id="6" name="Image 5">
-            <a:extLst>
-              <a:ext uri="{FF2B5EF4-FFF2-40B4-BE49-F238E27FC236}">
-                <a16:creationId xmlns:a16="http://schemas.microsoft.com/office/drawing/2014/main" id="{88058598-C884-8C65-29CB-2BD229FF45B7}"/>
+          <p:cNvPr id="8" name="Image 7">
+            <a:extLst>
+              <a:ext uri="{FF2B5EF4-FFF2-40B4-BE49-F238E27FC236}">
+                <a16:creationId xmlns:a16="http://schemas.microsoft.com/office/drawing/2014/main" id="{DB05CAD6-6D3E-590A-FCDF-1D26DD2396F1}"/>
               </a:ext>
             </a:extLst>
           </p:cNvPr>
@@ -6291,6 +6672,214 @@
         </p:blipFill>
         <p:spPr>
           <a:xfrm>
+            <a:off x="7295643" y="2514833"/>
+            <a:ext cx="2294795" cy="3465746"/>
+          </a:xfrm>
+          <a:prstGeom prst="rect">
+            <a:avLst/>
+          </a:prstGeom>
+        </p:spPr>
+      </p:pic>
+      <p:sp>
+        <p:nvSpPr>
+          <p:cNvPr id="9" name="ZoneTexte 8">
+            <a:extLst>
+              <a:ext uri="{FF2B5EF4-FFF2-40B4-BE49-F238E27FC236}">
+                <a16:creationId xmlns:a16="http://schemas.microsoft.com/office/drawing/2014/main" id="{AEA311CB-56A2-F3FB-E970-A713C2F95C49}"/>
+              </a:ext>
+            </a:extLst>
+          </p:cNvPr>
+          <p:cNvSpPr txBox="1"/>
+          <p:nvPr/>
+        </p:nvSpPr>
+        <p:spPr>
+          <a:xfrm>
+            <a:off x="9282896" y="5410110"/>
+            <a:ext cx="2617048" cy="461665"/>
+          </a:xfrm>
+          <a:prstGeom prst="rect">
+            <a:avLst/>
+          </a:prstGeom>
+          <a:noFill/>
+        </p:spPr>
+        <p:txBody>
+          <a:bodyPr wrap="square">
+            <a:spAutoFit/>
+          </a:bodyPr>
+          <a:lstStyle/>
+          <a:p>
+            <a:r>
+              <a:rPr lang="fr-FR" sz="2400" b="1" dirty="0"/>
+              <a:t>V</a:t>
+            </a:r>
+            <a:r>
+              <a:rPr lang="fr-FR" sz="2400" b="1" baseline="-25000" dirty="0"/>
+              <a:t>S</a:t>
+            </a:r>
+            <a:r>
+              <a:rPr lang="fr-FR" sz="2400" b="1" dirty="0"/>
+              <a:t> = R</a:t>
+            </a:r>
+            <a:r>
+              <a:rPr lang="fr-FR" sz="2400" b="1" baseline="-25000" dirty="0"/>
+              <a:t>PHD</a:t>
+            </a:r>
+            <a:r>
+              <a:rPr lang="fr-FR" sz="2400" b="1" dirty="0"/>
+              <a:t> . </a:t>
+            </a:r>
+            <a:r>
+              <a:rPr lang="fr-FR" sz="2400" b="1" dirty="0" err="1"/>
+              <a:t>I</a:t>
+            </a:r>
+            <a:r>
+              <a:rPr lang="fr-FR" sz="2400" b="1" baseline="-25000" dirty="0" err="1"/>
+              <a:t>photo</a:t>
+            </a:r>
+            <a:endParaRPr lang="fr-FR" sz="2400" b="1" baseline="-25000" dirty="0"/>
+          </a:p>
+        </p:txBody>
+      </p:sp>
+    </p:spTree>
+    <p:extLst>
+      <p:ext uri="{BB962C8B-B14F-4D97-AF65-F5344CB8AC3E}">
+        <p14:creationId xmlns:p14="http://schemas.microsoft.com/office/powerpoint/2010/main" val="1332532123"/>
+      </p:ext>
+    </p:extLst>
+  </p:cSld>
+  <p:clrMapOvr>
+    <a:masterClrMapping/>
+  </p:clrMapOvr>
+</p:sld>
+</file>
+
+<file path=ppt/slides/slide12.xml><?xml version="1.0" encoding="utf-8"?>
+<p:sld xmlns:a="http://schemas.openxmlformats.org/drawingml/2006/main" xmlns:r="http://schemas.openxmlformats.org/officeDocument/2006/relationships" xmlns:p="http://schemas.openxmlformats.org/presentationml/2006/main">
+  <p:cSld>
+    <p:spTree>
+      <p:nvGrpSpPr>
+        <p:cNvPr id="1" name=""/>
+        <p:cNvGrpSpPr/>
+        <p:nvPr/>
+      </p:nvGrpSpPr>
+      <p:grpSpPr>
+        <a:xfrm>
+          <a:off x="0" y="0"/>
+          <a:ext cx="0" cy="0"/>
+          <a:chOff x="0" y="0"/>
+          <a:chExt cx="0" cy="0"/>
+        </a:xfrm>
+      </p:grpSpPr>
+      <p:pic>
+        <p:nvPicPr>
+          <p:cNvPr id="7" name="Image 6">
+            <a:extLst>
+              <a:ext uri="{FF2B5EF4-FFF2-40B4-BE49-F238E27FC236}">
+                <a16:creationId xmlns:a16="http://schemas.microsoft.com/office/drawing/2014/main" id="{8AB73770-127F-410F-7D44-3AEA449E7A2C}"/>
+              </a:ext>
+            </a:extLst>
+          </p:cNvPr>
+          <p:cNvPicPr>
+            <a:picLocks noChangeAspect="1"/>
+          </p:cNvPicPr>
+          <p:nvPr/>
+        </p:nvPicPr>
+        <p:blipFill>
+          <a:blip r:embed="rId2"/>
+          <a:stretch>
+            <a:fillRect/>
+          </a:stretch>
+        </p:blipFill>
+        <p:spPr>
+          <a:xfrm>
+            <a:off x="9590438" y="461838"/>
+            <a:ext cx="1693258" cy="1196607"/>
+          </a:xfrm>
+          <a:prstGeom prst="rect">
+            <a:avLst/>
+          </a:prstGeom>
+        </p:spPr>
+      </p:pic>
+      <p:sp>
+        <p:nvSpPr>
+          <p:cNvPr id="2" name="Titre 1">
+            <a:extLst>
+              <a:ext uri="{FF2B5EF4-FFF2-40B4-BE49-F238E27FC236}">
+                <a16:creationId xmlns:a16="http://schemas.microsoft.com/office/drawing/2014/main" id="{693DE99D-D7A2-89F5-4CDD-A4230BF00E5E}"/>
+              </a:ext>
+            </a:extLst>
+          </p:cNvPr>
+          <p:cNvSpPr>
+            <a:spLocks noGrp="1"/>
+          </p:cNvSpPr>
+          <p:nvPr>
+            <p:ph type="title"/>
+          </p:nvPr>
+        </p:nvSpPr>
+        <p:spPr/>
+        <p:txBody>
+          <a:bodyPr/>
+          <a:lstStyle/>
+          <a:p>
+            <a:r>
+              <a:rPr lang="fr-FR" dirty="0"/>
+              <a:t>Modélisation</a:t>
+            </a:r>
+          </a:p>
+        </p:txBody>
+      </p:sp>
+      <p:pic>
+        <p:nvPicPr>
+          <p:cNvPr id="4" name="Image 3">
+            <a:extLst>
+              <a:ext uri="{FF2B5EF4-FFF2-40B4-BE49-F238E27FC236}">
+                <a16:creationId xmlns:a16="http://schemas.microsoft.com/office/drawing/2014/main" id="{EF31D6FF-1C88-7FBE-BD31-314EA3DAE0D0}"/>
+              </a:ext>
+            </a:extLst>
+          </p:cNvPr>
+          <p:cNvPicPr>
+            <a:picLocks noChangeAspect="1"/>
+          </p:cNvPicPr>
+          <p:nvPr/>
+        </p:nvPicPr>
+        <p:blipFill>
+          <a:blip r:embed="rId3"/>
+          <a:stretch>
+            <a:fillRect/>
+          </a:stretch>
+        </p:blipFill>
+        <p:spPr>
+          <a:xfrm>
+            <a:off x="584506" y="2185035"/>
+            <a:ext cx="5753100" cy="4124325"/>
+          </a:xfrm>
+          <a:prstGeom prst="rect">
+            <a:avLst/>
+          </a:prstGeom>
+        </p:spPr>
+      </p:pic>
+      <p:pic>
+        <p:nvPicPr>
+          <p:cNvPr id="6" name="Image 5">
+            <a:extLst>
+              <a:ext uri="{FF2B5EF4-FFF2-40B4-BE49-F238E27FC236}">
+                <a16:creationId xmlns:a16="http://schemas.microsoft.com/office/drawing/2014/main" id="{88058598-C884-8C65-29CB-2BD229FF45B7}"/>
+              </a:ext>
+            </a:extLst>
+          </p:cNvPr>
+          <p:cNvPicPr>
+            <a:picLocks noChangeAspect="1"/>
+          </p:cNvPicPr>
+          <p:nvPr/>
+        </p:nvPicPr>
+        <p:blipFill>
+          <a:blip r:embed="rId4"/>
+          <a:stretch>
+            <a:fillRect/>
+          </a:stretch>
+        </p:blipFill>
+        <p:spPr>
+          <a:xfrm>
             <a:off x="7068673" y="2659552"/>
             <a:ext cx="4629474" cy="3909580"/>
           </a:xfrm>
@@ -6299,6 +6888,45 @@
           </a:prstGeom>
         </p:spPr>
       </p:pic>
+      <p:sp>
+        <p:nvSpPr>
+          <p:cNvPr id="3" name="ZoneTexte 2">
+            <a:extLst>
+              <a:ext uri="{FF2B5EF4-FFF2-40B4-BE49-F238E27FC236}">
+                <a16:creationId xmlns:a16="http://schemas.microsoft.com/office/drawing/2014/main" id="{63137ED7-5B0B-2A92-C852-D41435377DF3}"/>
+              </a:ext>
+            </a:extLst>
+          </p:cNvPr>
+          <p:cNvSpPr txBox="1"/>
+          <p:nvPr/>
+        </p:nvSpPr>
+        <p:spPr>
+          <a:xfrm>
+            <a:off x="584506" y="6309360"/>
+            <a:ext cx="6051342" cy="369332"/>
+          </a:xfrm>
+          <a:prstGeom prst="rect">
+            <a:avLst/>
+          </a:prstGeom>
+          <a:noFill/>
+        </p:spPr>
+        <p:txBody>
+          <a:bodyPr wrap="square" rtlCol="0">
+            <a:spAutoFit/>
+          </a:bodyPr>
+          <a:lstStyle/>
+          <a:p>
+            <a:r>
+              <a:rPr lang="fr-FR" dirty="0">
+                <a:solidFill>
+                  <a:srgbClr val="FF0000"/>
+                </a:solidFill>
+              </a:rPr>
+              <a:t>Bande passante réduite (à cause du système de mesure)</a:t>
+            </a:r>
+          </a:p>
+        </p:txBody>
+      </p:sp>
     </p:spTree>
     <p:extLst>
       <p:ext uri="{BB962C8B-B14F-4D97-AF65-F5344CB8AC3E}">
@@ -6312,7 +6940,7 @@
 </p:sld>
 </file>
 
-<file path=ppt/slides/slide12.xml><?xml version="1.0" encoding="utf-8"?>
+<file path=ppt/slides/slide13.xml><?xml version="1.0" encoding="utf-8"?>
 <p:sld xmlns:a="http://schemas.openxmlformats.org/drawingml/2006/main" xmlns:r="http://schemas.openxmlformats.org/officeDocument/2006/relationships" xmlns:p="http://schemas.openxmlformats.org/presentationml/2006/main">
   <p:cSld>
     <p:bg>
@@ -6853,6 +7481,1989 @@
   </p:cSld>
   <p:clrMapOvr>
     <a:overrideClrMapping bg1="dk1" tx1="lt1" bg2="dk2" tx2="lt2" accent1="accent1" accent2="accent2" accent3="accent3" accent4="accent4" accent5="accent5" accent6="accent6" hlink="hlink" folHlink="folHlink"/>
+  </p:clrMapOvr>
+</p:sld>
+</file>
+
+<file path=ppt/slides/slide14.xml><?xml version="1.0" encoding="utf-8"?>
+<p:sld xmlns:a="http://schemas.openxmlformats.org/drawingml/2006/main" xmlns:r="http://schemas.openxmlformats.org/officeDocument/2006/relationships" xmlns:p="http://schemas.openxmlformats.org/presentationml/2006/main">
+  <p:cSld>
+    <p:spTree>
+      <p:nvGrpSpPr>
+        <p:cNvPr id="1" name=""/>
+        <p:cNvGrpSpPr/>
+        <p:nvPr/>
+      </p:nvGrpSpPr>
+      <p:grpSpPr>
+        <a:xfrm>
+          <a:off x="0" y="0"/>
+          <a:ext cx="0" cy="0"/>
+          <a:chOff x="0" y="0"/>
+          <a:chExt cx="0" cy="0"/>
+        </a:xfrm>
+      </p:grpSpPr>
+      <p:pic>
+        <p:nvPicPr>
+          <p:cNvPr id="7" name="Image 6">
+            <a:extLst>
+              <a:ext uri="{FF2B5EF4-FFF2-40B4-BE49-F238E27FC236}">
+                <a16:creationId xmlns:a16="http://schemas.microsoft.com/office/drawing/2014/main" id="{8AB73770-127F-410F-7D44-3AEA449E7A2C}"/>
+              </a:ext>
+            </a:extLst>
+          </p:cNvPr>
+          <p:cNvPicPr>
+            <a:picLocks noChangeAspect="1"/>
+          </p:cNvPicPr>
+          <p:nvPr/>
+        </p:nvPicPr>
+        <p:blipFill>
+          <a:blip r:embed="rId2"/>
+          <a:stretch>
+            <a:fillRect/>
+          </a:stretch>
+        </p:blipFill>
+        <p:spPr>
+          <a:xfrm>
+            <a:off x="9590438" y="461838"/>
+            <a:ext cx="1693258" cy="1196607"/>
+          </a:xfrm>
+          <a:prstGeom prst="rect">
+            <a:avLst/>
+          </a:prstGeom>
+        </p:spPr>
+      </p:pic>
+      <p:sp>
+        <p:nvSpPr>
+          <p:cNvPr id="2" name="Titre 1">
+            <a:extLst>
+              <a:ext uri="{FF2B5EF4-FFF2-40B4-BE49-F238E27FC236}">
+                <a16:creationId xmlns:a16="http://schemas.microsoft.com/office/drawing/2014/main" id="{693DE99D-D7A2-89F5-4CDD-A4230BF00E5E}"/>
+              </a:ext>
+            </a:extLst>
+          </p:cNvPr>
+          <p:cNvSpPr>
+            <a:spLocks noGrp="1"/>
+          </p:cNvSpPr>
+          <p:nvPr>
+            <p:ph type="title"/>
+          </p:nvPr>
+        </p:nvSpPr>
+        <p:spPr/>
+        <p:txBody>
+          <a:bodyPr/>
+          <a:lstStyle/>
+          <a:p>
+            <a:r>
+              <a:rPr lang="fr-FR" dirty="0"/>
+              <a:t>Montage </a:t>
+            </a:r>
+            <a:r>
+              <a:rPr lang="fr-FR" dirty="0" err="1"/>
+              <a:t>transimpédance</a:t>
+            </a:r>
+            <a:endParaRPr lang="fr-FR" dirty="0"/>
+          </a:p>
+        </p:txBody>
+      </p:sp>
+      <p:pic>
+        <p:nvPicPr>
+          <p:cNvPr id="6" name="Image 5">
+            <a:extLst>
+              <a:ext uri="{FF2B5EF4-FFF2-40B4-BE49-F238E27FC236}">
+                <a16:creationId xmlns:a16="http://schemas.microsoft.com/office/drawing/2014/main" id="{56F5300C-80EA-8D56-BEB2-0E236C673058}"/>
+              </a:ext>
+            </a:extLst>
+          </p:cNvPr>
+          <p:cNvPicPr>
+            <a:picLocks noChangeAspect="1"/>
+          </p:cNvPicPr>
+          <p:nvPr/>
+        </p:nvPicPr>
+        <p:blipFill>
+          <a:blip r:embed="rId3"/>
+          <a:stretch>
+            <a:fillRect/>
+          </a:stretch>
+        </p:blipFill>
+        <p:spPr>
+          <a:xfrm>
+            <a:off x="1118897" y="5029212"/>
+            <a:ext cx="2219567" cy="1685126"/>
+          </a:xfrm>
+          <a:prstGeom prst="rect">
+            <a:avLst/>
+          </a:prstGeom>
+        </p:spPr>
+      </p:pic>
+      <p:pic>
+        <p:nvPicPr>
+          <p:cNvPr id="11" name="Image 10">
+            <a:extLst>
+              <a:ext uri="{FF2B5EF4-FFF2-40B4-BE49-F238E27FC236}">
+                <a16:creationId xmlns:a16="http://schemas.microsoft.com/office/drawing/2014/main" id="{A80E7F5E-3491-DD54-A447-218B0553A495}"/>
+              </a:ext>
+            </a:extLst>
+          </p:cNvPr>
+          <p:cNvPicPr>
+            <a:picLocks noChangeAspect="1"/>
+          </p:cNvPicPr>
+          <p:nvPr/>
+        </p:nvPicPr>
+        <p:blipFill>
+          <a:blip r:embed="rId4"/>
+          <a:stretch>
+            <a:fillRect/>
+          </a:stretch>
+        </p:blipFill>
+        <p:spPr>
+          <a:xfrm>
+            <a:off x="549706" y="2089944"/>
+            <a:ext cx="6524359" cy="3039841"/>
+          </a:xfrm>
+          <a:prstGeom prst="rect">
+            <a:avLst/>
+          </a:prstGeom>
+        </p:spPr>
+      </p:pic>
+      <p:sp>
+        <p:nvSpPr>
+          <p:cNvPr id="12" name="Rectangle 11">
+            <a:extLst>
+              <a:ext uri="{FF2B5EF4-FFF2-40B4-BE49-F238E27FC236}">
+                <a16:creationId xmlns:a16="http://schemas.microsoft.com/office/drawing/2014/main" id="{4D45C889-C661-58C3-BFFA-E496108B4DDE}"/>
+              </a:ext>
+            </a:extLst>
+          </p:cNvPr>
+          <p:cNvSpPr/>
+          <p:nvPr/>
+        </p:nvSpPr>
+        <p:spPr>
+          <a:xfrm>
+            <a:off x="6006478" y="2186872"/>
+            <a:ext cx="1481560" cy="1088764"/>
+          </a:xfrm>
+          <a:prstGeom prst="rect">
+            <a:avLst/>
+          </a:prstGeom>
+          <a:solidFill>
+            <a:schemeClr val="bg1"/>
+          </a:solidFill>
+          <a:ln>
+            <a:noFill/>
+          </a:ln>
+        </p:spPr>
+        <p:style>
+          <a:lnRef idx="2">
+            <a:schemeClr val="accent1">
+              <a:shade val="15000"/>
+            </a:schemeClr>
+          </a:lnRef>
+          <a:fillRef idx="1">
+            <a:schemeClr val="accent1"/>
+          </a:fillRef>
+          <a:effectRef idx="0">
+            <a:schemeClr val="accent1"/>
+          </a:effectRef>
+          <a:fontRef idx="minor">
+            <a:schemeClr val="lt1"/>
+          </a:fontRef>
+        </p:style>
+        <p:txBody>
+          <a:bodyPr rtlCol="0" anchor="ctr"/>
+          <a:lstStyle/>
+          <a:p>
+            <a:pPr algn="ctr"/>
+            <a:endParaRPr lang="fr-FR">
+              <a:solidFill>
+                <a:schemeClr val="bg1"/>
+              </a:solidFill>
+            </a:endParaRPr>
+          </a:p>
+        </p:txBody>
+      </p:sp>
+      <p:sp>
+        <p:nvSpPr>
+          <p:cNvPr id="13" name="Rectangle 12">
+            <a:extLst>
+              <a:ext uri="{FF2B5EF4-FFF2-40B4-BE49-F238E27FC236}">
+                <a16:creationId xmlns:a16="http://schemas.microsoft.com/office/drawing/2014/main" id="{59D24501-07DC-9B8F-BEE2-E57E41221B63}"/>
+              </a:ext>
+            </a:extLst>
+          </p:cNvPr>
+          <p:cNvSpPr/>
+          <p:nvPr/>
+        </p:nvSpPr>
+        <p:spPr>
+          <a:xfrm>
+            <a:off x="6006478" y="4315853"/>
+            <a:ext cx="1481560" cy="1088764"/>
+          </a:xfrm>
+          <a:prstGeom prst="rect">
+            <a:avLst/>
+          </a:prstGeom>
+          <a:solidFill>
+            <a:schemeClr val="bg1"/>
+          </a:solidFill>
+          <a:ln>
+            <a:noFill/>
+          </a:ln>
+        </p:spPr>
+        <p:style>
+          <a:lnRef idx="2">
+            <a:schemeClr val="accent1">
+              <a:shade val="15000"/>
+            </a:schemeClr>
+          </a:lnRef>
+          <a:fillRef idx="1">
+            <a:schemeClr val="accent1"/>
+          </a:fillRef>
+          <a:effectRef idx="0">
+            <a:schemeClr val="accent1"/>
+          </a:effectRef>
+          <a:fontRef idx="minor">
+            <a:schemeClr val="lt1"/>
+          </a:fontRef>
+        </p:style>
+        <p:txBody>
+          <a:bodyPr rtlCol="0" anchor="ctr"/>
+          <a:lstStyle/>
+          <a:p>
+            <a:pPr algn="ctr"/>
+            <a:endParaRPr lang="fr-FR">
+              <a:solidFill>
+                <a:schemeClr val="bg1"/>
+              </a:solidFill>
+            </a:endParaRPr>
+          </a:p>
+        </p:txBody>
+      </p:sp>
+      <p:pic>
+        <p:nvPicPr>
+          <p:cNvPr id="4" name="Image 3">
+            <a:extLst>
+              <a:ext uri="{FF2B5EF4-FFF2-40B4-BE49-F238E27FC236}">
+                <a16:creationId xmlns:a16="http://schemas.microsoft.com/office/drawing/2014/main" id="{FDE259DA-79A7-BC65-C50F-D24D517B205E}"/>
+              </a:ext>
+            </a:extLst>
+          </p:cNvPr>
+          <p:cNvPicPr>
+            <a:picLocks noChangeAspect="1"/>
+          </p:cNvPicPr>
+          <p:nvPr/>
+        </p:nvPicPr>
+        <p:blipFill>
+          <a:blip r:embed="rId5"/>
+          <a:stretch>
+            <a:fillRect/>
+          </a:stretch>
+        </p:blipFill>
+        <p:spPr>
+          <a:xfrm>
+            <a:off x="7356472" y="3062751"/>
+            <a:ext cx="3716631" cy="1836305"/>
+          </a:xfrm>
+          <a:prstGeom prst="rect">
+            <a:avLst/>
+          </a:prstGeom>
+        </p:spPr>
+      </p:pic>
+      <p:sp>
+        <p:nvSpPr>
+          <p:cNvPr id="8" name="ZoneTexte 7">
+            <a:extLst>
+              <a:ext uri="{FF2B5EF4-FFF2-40B4-BE49-F238E27FC236}">
+                <a16:creationId xmlns:a16="http://schemas.microsoft.com/office/drawing/2014/main" id="{65AD3147-ACA1-CD9D-CB88-70D69A81E25C}"/>
+              </a:ext>
+            </a:extLst>
+          </p:cNvPr>
+          <p:cNvSpPr txBox="1"/>
+          <p:nvPr/>
+        </p:nvSpPr>
+        <p:spPr>
+          <a:xfrm>
+            <a:off x="9313952" y="5313270"/>
+            <a:ext cx="2246230" cy="461665"/>
+          </a:xfrm>
+          <a:prstGeom prst="rect">
+            <a:avLst/>
+          </a:prstGeom>
+          <a:noFill/>
+        </p:spPr>
+        <p:txBody>
+          <a:bodyPr wrap="square">
+            <a:spAutoFit/>
+          </a:bodyPr>
+          <a:lstStyle/>
+          <a:p>
+            <a:r>
+              <a:rPr lang="fr-FR" sz="2400" b="1" dirty="0"/>
+              <a:t>V</a:t>
+            </a:r>
+            <a:r>
+              <a:rPr lang="fr-FR" sz="2400" b="1" baseline="-25000" dirty="0"/>
+              <a:t>S</a:t>
+            </a:r>
+            <a:r>
+              <a:rPr lang="fr-FR" sz="2400" b="1" dirty="0"/>
+              <a:t> = R</a:t>
+            </a:r>
+            <a:r>
+              <a:rPr lang="fr-FR" sz="2400" b="1" baseline="-25000" dirty="0"/>
+              <a:t>T</a:t>
+            </a:r>
+            <a:r>
+              <a:rPr lang="fr-FR" sz="2400" b="1" dirty="0"/>
+              <a:t> . </a:t>
+            </a:r>
+            <a:r>
+              <a:rPr lang="fr-FR" sz="2400" b="1" dirty="0" err="1"/>
+              <a:t>I</a:t>
+            </a:r>
+            <a:r>
+              <a:rPr lang="fr-FR" sz="2400" b="1" baseline="-25000" dirty="0" err="1"/>
+              <a:t>photo</a:t>
+            </a:r>
+            <a:endParaRPr lang="fr-FR" sz="2400" b="1" baseline="-25000" dirty="0"/>
+          </a:p>
+        </p:txBody>
+      </p:sp>
+    </p:spTree>
+    <p:extLst>
+      <p:ext uri="{BB962C8B-B14F-4D97-AF65-F5344CB8AC3E}">
+        <p14:creationId xmlns:p14="http://schemas.microsoft.com/office/powerpoint/2010/main" val="1426243532"/>
+      </p:ext>
+    </p:extLst>
+  </p:cSld>
+  <p:clrMapOvr>
+    <a:masterClrMapping/>
+  </p:clrMapOvr>
+</p:sld>
+</file>
+
+<file path=ppt/slides/slide15.xml><?xml version="1.0" encoding="utf-8"?>
+<p:sld xmlns:a="http://schemas.openxmlformats.org/drawingml/2006/main" xmlns:r="http://schemas.openxmlformats.org/officeDocument/2006/relationships" xmlns:p="http://schemas.openxmlformats.org/presentationml/2006/main">
+  <p:cSld>
+    <p:spTree>
+      <p:nvGrpSpPr>
+        <p:cNvPr id="1" name=""/>
+        <p:cNvGrpSpPr/>
+        <p:nvPr/>
+      </p:nvGrpSpPr>
+      <p:grpSpPr>
+        <a:xfrm>
+          <a:off x="0" y="0"/>
+          <a:ext cx="0" cy="0"/>
+          <a:chOff x="0" y="0"/>
+          <a:chExt cx="0" cy="0"/>
+        </a:xfrm>
+      </p:grpSpPr>
+      <p:pic>
+        <p:nvPicPr>
+          <p:cNvPr id="7" name="Image 6">
+            <a:extLst>
+              <a:ext uri="{FF2B5EF4-FFF2-40B4-BE49-F238E27FC236}">
+                <a16:creationId xmlns:a16="http://schemas.microsoft.com/office/drawing/2014/main" id="{8AB73770-127F-410F-7D44-3AEA449E7A2C}"/>
+              </a:ext>
+            </a:extLst>
+          </p:cNvPr>
+          <p:cNvPicPr>
+            <a:picLocks noChangeAspect="1"/>
+          </p:cNvPicPr>
+          <p:nvPr/>
+        </p:nvPicPr>
+        <p:blipFill>
+          <a:blip r:embed="rId2"/>
+          <a:stretch>
+            <a:fillRect/>
+          </a:stretch>
+        </p:blipFill>
+        <p:spPr>
+          <a:xfrm>
+            <a:off x="9590438" y="461838"/>
+            <a:ext cx="1693258" cy="1196607"/>
+          </a:xfrm>
+          <a:prstGeom prst="rect">
+            <a:avLst/>
+          </a:prstGeom>
+        </p:spPr>
+      </p:pic>
+      <p:sp>
+        <p:nvSpPr>
+          <p:cNvPr id="2" name="Titre 1">
+            <a:extLst>
+              <a:ext uri="{FF2B5EF4-FFF2-40B4-BE49-F238E27FC236}">
+                <a16:creationId xmlns:a16="http://schemas.microsoft.com/office/drawing/2014/main" id="{693DE99D-D7A2-89F5-4CDD-A4230BF00E5E}"/>
+              </a:ext>
+            </a:extLst>
+          </p:cNvPr>
+          <p:cNvSpPr>
+            <a:spLocks noGrp="1"/>
+          </p:cNvSpPr>
+          <p:nvPr>
+            <p:ph type="title"/>
+          </p:nvPr>
+        </p:nvSpPr>
+        <p:spPr/>
+        <p:txBody>
+          <a:bodyPr/>
+          <a:lstStyle/>
+          <a:p>
+            <a:r>
+              <a:rPr lang="fr-FR" dirty="0"/>
+              <a:t>Etude expérimentale</a:t>
+            </a:r>
+          </a:p>
+        </p:txBody>
+      </p:sp>
+      <p:pic>
+        <p:nvPicPr>
+          <p:cNvPr id="3" name="Image 2">
+            <a:extLst>
+              <a:ext uri="{FF2B5EF4-FFF2-40B4-BE49-F238E27FC236}">
+                <a16:creationId xmlns:a16="http://schemas.microsoft.com/office/drawing/2014/main" id="{019BF2BE-07EB-17FA-7608-432ADDA6F5D1}"/>
+              </a:ext>
+            </a:extLst>
+          </p:cNvPr>
+          <p:cNvPicPr>
+            <a:picLocks noChangeAspect="1"/>
+          </p:cNvPicPr>
+          <p:nvPr/>
+        </p:nvPicPr>
+        <p:blipFill>
+          <a:blip r:embed="rId3"/>
+          <a:stretch>
+            <a:fillRect/>
+          </a:stretch>
+        </p:blipFill>
+        <p:spPr>
+          <a:xfrm>
+            <a:off x="7356472" y="3062751"/>
+            <a:ext cx="3716631" cy="1836305"/>
+          </a:xfrm>
+          <a:prstGeom prst="rect">
+            <a:avLst/>
+          </a:prstGeom>
+        </p:spPr>
+      </p:pic>
+      <p:sp>
+        <p:nvSpPr>
+          <p:cNvPr id="5" name="ZoneTexte 4">
+            <a:extLst>
+              <a:ext uri="{FF2B5EF4-FFF2-40B4-BE49-F238E27FC236}">
+                <a16:creationId xmlns:a16="http://schemas.microsoft.com/office/drawing/2014/main" id="{DEF0DD65-666D-5D3C-6F9E-374FAC0E82D4}"/>
+              </a:ext>
+            </a:extLst>
+          </p:cNvPr>
+          <p:cNvSpPr txBox="1"/>
+          <p:nvPr/>
+        </p:nvSpPr>
+        <p:spPr>
+          <a:xfrm>
+            <a:off x="9313952" y="5313270"/>
+            <a:ext cx="2246230" cy="461665"/>
+          </a:xfrm>
+          <a:prstGeom prst="rect">
+            <a:avLst/>
+          </a:prstGeom>
+          <a:noFill/>
+        </p:spPr>
+        <p:txBody>
+          <a:bodyPr wrap="square">
+            <a:spAutoFit/>
+          </a:bodyPr>
+          <a:lstStyle/>
+          <a:p>
+            <a:r>
+              <a:rPr lang="fr-FR" sz="2400" b="1" dirty="0"/>
+              <a:t>V</a:t>
+            </a:r>
+            <a:r>
+              <a:rPr lang="fr-FR" sz="2400" b="1" baseline="-25000" dirty="0"/>
+              <a:t>S</a:t>
+            </a:r>
+            <a:r>
+              <a:rPr lang="fr-FR" sz="2400" b="1" dirty="0"/>
+              <a:t> = R</a:t>
+            </a:r>
+            <a:r>
+              <a:rPr lang="fr-FR" sz="2400" b="1" baseline="-25000" dirty="0"/>
+              <a:t>T</a:t>
+            </a:r>
+            <a:r>
+              <a:rPr lang="fr-FR" sz="2400" b="1" dirty="0"/>
+              <a:t> . </a:t>
+            </a:r>
+            <a:r>
+              <a:rPr lang="fr-FR" sz="2400" b="1" dirty="0" err="1"/>
+              <a:t>I</a:t>
+            </a:r>
+            <a:r>
+              <a:rPr lang="fr-FR" sz="2400" b="1" baseline="-25000" dirty="0" err="1"/>
+              <a:t>photo</a:t>
+            </a:r>
+            <a:endParaRPr lang="fr-FR" sz="2400" b="1" baseline="-25000" dirty="0"/>
+          </a:p>
+        </p:txBody>
+      </p:sp>
+      <p:pic>
+        <p:nvPicPr>
+          <p:cNvPr id="6" name="Image 5">
+            <a:extLst>
+              <a:ext uri="{FF2B5EF4-FFF2-40B4-BE49-F238E27FC236}">
+                <a16:creationId xmlns:a16="http://schemas.microsoft.com/office/drawing/2014/main" id="{6EA0F668-1C52-4DEE-F5B9-4523E3F5251F}"/>
+              </a:ext>
+            </a:extLst>
+          </p:cNvPr>
+          <p:cNvPicPr>
+            <a:picLocks noChangeAspect="1"/>
+          </p:cNvPicPr>
+          <p:nvPr/>
+        </p:nvPicPr>
+        <p:blipFill>
+          <a:blip r:embed="rId4"/>
+          <a:stretch>
+            <a:fillRect/>
+          </a:stretch>
+        </p:blipFill>
+        <p:spPr>
+          <a:xfrm>
+            <a:off x="804476" y="2256083"/>
+            <a:ext cx="5362999" cy="4279187"/>
+          </a:xfrm>
+          <a:prstGeom prst="rect">
+            <a:avLst/>
+          </a:prstGeom>
+        </p:spPr>
+      </p:pic>
+    </p:spTree>
+    <p:extLst>
+      <p:ext uri="{BB962C8B-B14F-4D97-AF65-F5344CB8AC3E}">
+        <p14:creationId xmlns:p14="http://schemas.microsoft.com/office/powerpoint/2010/main" val="3363007804"/>
+      </p:ext>
+    </p:extLst>
+  </p:cSld>
+  <p:clrMapOvr>
+    <a:masterClrMapping/>
+  </p:clrMapOvr>
+</p:sld>
+</file>
+
+<file path=ppt/slides/slide16.xml><?xml version="1.0" encoding="utf-8"?>
+<p:sld xmlns:a="http://schemas.openxmlformats.org/drawingml/2006/main" xmlns:r="http://schemas.openxmlformats.org/officeDocument/2006/relationships" xmlns:p="http://schemas.openxmlformats.org/presentationml/2006/main">
+  <p:cSld>
+    <p:spTree>
+      <p:nvGrpSpPr>
+        <p:cNvPr id="1" name=""/>
+        <p:cNvGrpSpPr/>
+        <p:nvPr/>
+      </p:nvGrpSpPr>
+      <p:grpSpPr>
+        <a:xfrm>
+          <a:off x="0" y="0"/>
+          <a:ext cx="0" cy="0"/>
+          <a:chOff x="0" y="0"/>
+          <a:chExt cx="0" cy="0"/>
+        </a:xfrm>
+      </p:grpSpPr>
+      <p:pic>
+        <p:nvPicPr>
+          <p:cNvPr id="7" name="Image 6">
+            <a:extLst>
+              <a:ext uri="{FF2B5EF4-FFF2-40B4-BE49-F238E27FC236}">
+                <a16:creationId xmlns:a16="http://schemas.microsoft.com/office/drawing/2014/main" id="{8AB73770-127F-410F-7D44-3AEA449E7A2C}"/>
+              </a:ext>
+            </a:extLst>
+          </p:cNvPr>
+          <p:cNvPicPr>
+            <a:picLocks noChangeAspect="1"/>
+          </p:cNvPicPr>
+          <p:nvPr/>
+        </p:nvPicPr>
+        <p:blipFill>
+          <a:blip r:embed="rId2"/>
+          <a:stretch>
+            <a:fillRect/>
+          </a:stretch>
+        </p:blipFill>
+        <p:spPr>
+          <a:xfrm>
+            <a:off x="9590438" y="461838"/>
+            <a:ext cx="1693258" cy="1196607"/>
+          </a:xfrm>
+          <a:prstGeom prst="rect">
+            <a:avLst/>
+          </a:prstGeom>
+        </p:spPr>
+      </p:pic>
+      <p:sp>
+        <p:nvSpPr>
+          <p:cNvPr id="2" name="Titre 1">
+            <a:extLst>
+              <a:ext uri="{FF2B5EF4-FFF2-40B4-BE49-F238E27FC236}">
+                <a16:creationId xmlns:a16="http://schemas.microsoft.com/office/drawing/2014/main" id="{693DE99D-D7A2-89F5-4CDD-A4230BF00E5E}"/>
+              </a:ext>
+            </a:extLst>
+          </p:cNvPr>
+          <p:cNvSpPr>
+            <a:spLocks noGrp="1"/>
+          </p:cNvSpPr>
+          <p:nvPr>
+            <p:ph type="title"/>
+          </p:nvPr>
+        </p:nvSpPr>
+        <p:spPr/>
+        <p:txBody>
+          <a:bodyPr/>
+          <a:lstStyle/>
+          <a:p>
+            <a:r>
+              <a:rPr lang="fr-FR" dirty="0"/>
+              <a:t>Modélisation</a:t>
+            </a:r>
+          </a:p>
+        </p:txBody>
+      </p:sp>
+      <p:pic>
+        <p:nvPicPr>
+          <p:cNvPr id="3" name="Image 2">
+            <a:extLst>
+              <a:ext uri="{FF2B5EF4-FFF2-40B4-BE49-F238E27FC236}">
+                <a16:creationId xmlns:a16="http://schemas.microsoft.com/office/drawing/2014/main" id="{9474B56B-6354-B81A-AF5D-B668DE03E27A}"/>
+              </a:ext>
+            </a:extLst>
+          </p:cNvPr>
+          <p:cNvPicPr>
+            <a:picLocks noChangeAspect="1"/>
+          </p:cNvPicPr>
+          <p:nvPr/>
+        </p:nvPicPr>
+        <p:blipFill>
+          <a:blip r:embed="rId3"/>
+          <a:stretch>
+            <a:fillRect/>
+          </a:stretch>
+        </p:blipFill>
+        <p:spPr>
+          <a:xfrm>
+            <a:off x="804476" y="2256083"/>
+            <a:ext cx="5362999" cy="4279187"/>
+          </a:xfrm>
+          <a:prstGeom prst="rect">
+            <a:avLst/>
+          </a:prstGeom>
+        </p:spPr>
+      </p:pic>
+      <p:pic>
+        <p:nvPicPr>
+          <p:cNvPr id="5" name="Image 4">
+            <a:extLst>
+              <a:ext uri="{FF2B5EF4-FFF2-40B4-BE49-F238E27FC236}">
+                <a16:creationId xmlns:a16="http://schemas.microsoft.com/office/drawing/2014/main" id="{B7D95164-EA74-0E18-2C78-F1D719E8FFC2}"/>
+              </a:ext>
+            </a:extLst>
+          </p:cNvPr>
+          <p:cNvPicPr>
+            <a:picLocks noChangeAspect="1"/>
+          </p:cNvPicPr>
+          <p:nvPr/>
+        </p:nvPicPr>
+        <p:blipFill>
+          <a:blip r:embed="rId4"/>
+          <a:stretch>
+            <a:fillRect/>
+          </a:stretch>
+        </p:blipFill>
+        <p:spPr>
+          <a:xfrm>
+            <a:off x="5256980" y="2407961"/>
+            <a:ext cx="6458926" cy="2514213"/>
+          </a:xfrm>
+          <a:prstGeom prst="rect">
+            <a:avLst/>
+          </a:prstGeom>
+        </p:spPr>
+      </p:pic>
+    </p:spTree>
+    <p:extLst>
+      <p:ext uri="{BB962C8B-B14F-4D97-AF65-F5344CB8AC3E}">
+        <p14:creationId xmlns:p14="http://schemas.microsoft.com/office/powerpoint/2010/main" val="1161877794"/>
+      </p:ext>
+    </p:extLst>
+  </p:cSld>
+  <p:clrMapOvr>
+    <a:masterClrMapping/>
+  </p:clrMapOvr>
+</p:sld>
+</file>
+
+<file path=ppt/slides/slide17.xml><?xml version="1.0" encoding="utf-8"?>
+<p:sld xmlns:a="http://schemas.openxmlformats.org/drawingml/2006/main" xmlns:r="http://schemas.openxmlformats.org/officeDocument/2006/relationships" xmlns:p="http://schemas.openxmlformats.org/presentationml/2006/main">
+  <p:cSld>
+    <p:spTree>
+      <p:nvGrpSpPr>
+        <p:cNvPr id="1" name=""/>
+        <p:cNvGrpSpPr/>
+        <p:nvPr/>
+      </p:nvGrpSpPr>
+      <p:grpSpPr>
+        <a:xfrm>
+          <a:off x="0" y="0"/>
+          <a:ext cx="0" cy="0"/>
+          <a:chOff x="0" y="0"/>
+          <a:chExt cx="0" cy="0"/>
+        </a:xfrm>
+      </p:grpSpPr>
+      <p:sp>
+        <p:nvSpPr>
+          <p:cNvPr id="2" name="Titre 1">
+            <a:extLst>
+              <a:ext uri="{FF2B5EF4-FFF2-40B4-BE49-F238E27FC236}">
+                <a16:creationId xmlns:a16="http://schemas.microsoft.com/office/drawing/2014/main" id="{693DE99D-D7A2-89F5-4CDD-A4230BF00E5E}"/>
+              </a:ext>
+            </a:extLst>
+          </p:cNvPr>
+          <p:cNvSpPr>
+            <a:spLocks noGrp="1"/>
+          </p:cNvSpPr>
+          <p:nvPr>
+            <p:ph type="title"/>
+          </p:nvPr>
+        </p:nvSpPr>
+        <p:spPr/>
+        <p:txBody>
+          <a:bodyPr/>
+          <a:lstStyle/>
+          <a:p>
+            <a:r>
+              <a:rPr lang="fr-FR" dirty="0"/>
+              <a:t>ALI / Passe-bas</a:t>
+            </a:r>
+          </a:p>
+        </p:txBody>
+      </p:sp>
+      <p:pic>
+        <p:nvPicPr>
+          <p:cNvPr id="4" name="Image 3">
+            <a:extLst>
+              <a:ext uri="{FF2B5EF4-FFF2-40B4-BE49-F238E27FC236}">
+                <a16:creationId xmlns:a16="http://schemas.microsoft.com/office/drawing/2014/main" id="{BB1D38A6-EED3-CCE3-8088-E954F4C6B5B3}"/>
+              </a:ext>
+            </a:extLst>
+          </p:cNvPr>
+          <p:cNvPicPr>
+            <a:picLocks noChangeAspect="1"/>
+          </p:cNvPicPr>
+          <p:nvPr/>
+        </p:nvPicPr>
+        <p:blipFill>
+          <a:blip r:embed="rId2"/>
+          <a:stretch>
+            <a:fillRect/>
+          </a:stretch>
+        </p:blipFill>
+        <p:spPr>
+          <a:xfrm>
+            <a:off x="5758063" y="4377600"/>
+            <a:ext cx="6200775" cy="2286000"/>
+          </a:xfrm>
+          <a:prstGeom prst="rect">
+            <a:avLst/>
+          </a:prstGeom>
+        </p:spPr>
+      </p:pic>
+      <p:sp>
+        <p:nvSpPr>
+          <p:cNvPr id="6" name="Rectangle 5">
+            <a:extLst>
+              <a:ext uri="{FF2B5EF4-FFF2-40B4-BE49-F238E27FC236}">
+                <a16:creationId xmlns:a16="http://schemas.microsoft.com/office/drawing/2014/main" id="{7677CBF2-3CE1-5B79-68AB-3069AC22B3F5}"/>
+              </a:ext>
+            </a:extLst>
+          </p:cNvPr>
+          <p:cNvSpPr/>
+          <p:nvPr/>
+        </p:nvSpPr>
+        <p:spPr>
+          <a:xfrm>
+            <a:off x="5825471" y="5150121"/>
+            <a:ext cx="6123742" cy="485619"/>
+          </a:xfrm>
+          <a:prstGeom prst="rect">
+            <a:avLst/>
+          </a:prstGeom>
+          <a:solidFill>
+            <a:srgbClr val="002060">
+              <a:alpha val="30000"/>
+            </a:srgbClr>
+          </a:solidFill>
+          <a:ln>
+            <a:noFill/>
+          </a:ln>
+        </p:spPr>
+        <p:style>
+          <a:lnRef idx="2">
+            <a:schemeClr val="accent1">
+              <a:shade val="50000"/>
+            </a:schemeClr>
+          </a:lnRef>
+          <a:fillRef idx="1">
+            <a:schemeClr val="accent1"/>
+          </a:fillRef>
+          <a:effectRef idx="0">
+            <a:schemeClr val="accent1"/>
+          </a:effectRef>
+          <a:fontRef idx="minor">
+            <a:schemeClr val="lt1"/>
+          </a:fontRef>
+        </p:style>
+        <p:txBody>
+          <a:bodyPr rtlCol="0" anchor="ctr"/>
+          <a:lstStyle/>
+          <a:p>
+            <a:pPr algn="ctr"/>
+            <a:endParaRPr lang="fr-FR" dirty="0"/>
+          </a:p>
+        </p:txBody>
+      </p:sp>
+      <p:sp>
+        <p:nvSpPr>
+          <p:cNvPr id="8" name="Rectangle 7">
+            <a:extLst>
+              <a:ext uri="{FF2B5EF4-FFF2-40B4-BE49-F238E27FC236}">
+                <a16:creationId xmlns:a16="http://schemas.microsoft.com/office/drawing/2014/main" id="{1BF79F2C-0D57-73DC-5718-F5711E168A1F}"/>
+              </a:ext>
+            </a:extLst>
+          </p:cNvPr>
+          <p:cNvSpPr/>
+          <p:nvPr/>
+        </p:nvSpPr>
+        <p:spPr>
+          <a:xfrm>
+            <a:off x="5825471" y="6240509"/>
+            <a:ext cx="6123742" cy="237293"/>
+          </a:xfrm>
+          <a:prstGeom prst="rect">
+            <a:avLst/>
+          </a:prstGeom>
+          <a:solidFill>
+            <a:schemeClr val="accent2">
+              <a:alpha val="40000"/>
+            </a:schemeClr>
+          </a:solidFill>
+          <a:ln>
+            <a:noFill/>
+          </a:ln>
+        </p:spPr>
+        <p:style>
+          <a:lnRef idx="2">
+            <a:schemeClr val="accent1">
+              <a:shade val="50000"/>
+            </a:schemeClr>
+          </a:lnRef>
+          <a:fillRef idx="1">
+            <a:schemeClr val="accent1"/>
+          </a:fillRef>
+          <a:effectRef idx="0">
+            <a:schemeClr val="accent1"/>
+          </a:effectRef>
+          <a:fontRef idx="minor">
+            <a:schemeClr val="lt1"/>
+          </a:fontRef>
+        </p:style>
+        <p:txBody>
+          <a:bodyPr rtlCol="0" anchor="ctr"/>
+          <a:lstStyle/>
+          <a:p>
+            <a:pPr algn="ctr"/>
+            <a:endParaRPr lang="fr-FR"/>
+          </a:p>
+        </p:txBody>
+      </p:sp>
+      <p:pic>
+        <p:nvPicPr>
+          <p:cNvPr id="9" name="Image 8">
+            <a:extLst>
+              <a:ext uri="{FF2B5EF4-FFF2-40B4-BE49-F238E27FC236}">
+                <a16:creationId xmlns:a16="http://schemas.microsoft.com/office/drawing/2014/main" id="{FD5828A2-B152-E28A-6E89-A49C0965AD6B}"/>
+              </a:ext>
+            </a:extLst>
+          </p:cNvPr>
+          <p:cNvPicPr>
+            <a:picLocks noChangeAspect="1"/>
+          </p:cNvPicPr>
+          <p:nvPr/>
+        </p:nvPicPr>
+        <p:blipFill>
+          <a:blip r:embed="rId3"/>
+          <a:stretch>
+            <a:fillRect/>
+          </a:stretch>
+        </p:blipFill>
+        <p:spPr>
+          <a:xfrm>
+            <a:off x="971203" y="2447042"/>
+            <a:ext cx="4133729" cy="3519988"/>
+          </a:xfrm>
+          <a:prstGeom prst="rect">
+            <a:avLst/>
+          </a:prstGeom>
+        </p:spPr>
+      </p:pic>
+      <p:pic>
+        <p:nvPicPr>
+          <p:cNvPr id="10" name="Picture 2" descr="Product Image">
+            <a:extLst>
+              <a:ext uri="{FF2B5EF4-FFF2-40B4-BE49-F238E27FC236}">
+                <a16:creationId xmlns:a16="http://schemas.microsoft.com/office/drawing/2014/main" id="{9A66F051-B034-6CE1-5ECD-7FD86781B181}"/>
+              </a:ext>
+            </a:extLst>
+          </p:cNvPr>
+          <p:cNvPicPr>
+            <a:picLocks noChangeAspect="1" noChangeArrowheads="1"/>
+          </p:cNvPicPr>
+          <p:nvPr/>
+        </p:nvPicPr>
+        <p:blipFill>
+          <a:blip r:embed="rId4">
+            <a:extLst>
+              <a:ext uri="{28A0092B-C50C-407E-A947-70E740481C1C}">
+                <a14:useLocalDpi xmlns:a14="http://schemas.microsoft.com/office/drawing/2010/main" val="0"/>
+              </a:ext>
+            </a:extLst>
+          </a:blip>
+          <a:srcRect/>
+          <a:stretch>
+            <a:fillRect/>
+          </a:stretch>
+        </p:blipFill>
+        <p:spPr bwMode="auto">
+          <a:xfrm>
+            <a:off x="10281383" y="277955"/>
+            <a:ext cx="1314450" cy="1428750"/>
+          </a:xfrm>
+          <a:prstGeom prst="rect">
+            <a:avLst/>
+          </a:prstGeom>
+          <a:noFill/>
+          <a:extLst>
+            <a:ext uri="{909E8E84-426E-40DD-AFC4-6F175D3DCCD1}">
+              <a14:hiddenFill xmlns:a14="http://schemas.microsoft.com/office/drawing/2010/main">
+                <a:solidFill>
+                  <a:srgbClr val="FFFFFF"/>
+                </a:solidFill>
+              </a14:hiddenFill>
+            </a:ext>
+          </a:extLst>
+        </p:spPr>
+      </p:pic>
+      <p:sp>
+        <p:nvSpPr>
+          <p:cNvPr id="11" name="ZoneTexte 10">
+            <a:extLst>
+              <a:ext uri="{FF2B5EF4-FFF2-40B4-BE49-F238E27FC236}">
+                <a16:creationId xmlns:a16="http://schemas.microsoft.com/office/drawing/2014/main" id="{6A806563-DFA0-C7FC-399A-CFC7E237AF51}"/>
+              </a:ext>
+            </a:extLst>
+          </p:cNvPr>
+          <p:cNvSpPr txBox="1"/>
+          <p:nvPr/>
+        </p:nvSpPr>
+        <p:spPr>
+          <a:xfrm>
+            <a:off x="5652245" y="2664054"/>
+            <a:ext cx="6306593" cy="461665"/>
+          </a:xfrm>
+          <a:prstGeom prst="rect">
+            <a:avLst/>
+          </a:prstGeom>
+          <a:noFill/>
+        </p:spPr>
+        <p:txBody>
+          <a:bodyPr wrap="square" rtlCol="0">
+            <a:spAutoFit/>
+          </a:bodyPr>
+          <a:lstStyle/>
+          <a:p>
+            <a:r>
+              <a:rPr lang="fr-FR" sz="2400" dirty="0">
+                <a:solidFill>
+                  <a:schemeClr val="accent2"/>
+                </a:solidFill>
+                <a:latin typeface="Raleway ExtraBold" pitchFamily="2" charset="0"/>
+              </a:rPr>
+              <a:t>Produit Gain-Bande-Passante constant</a:t>
+            </a:r>
+            <a:endParaRPr lang="fr-FR" sz="2400" dirty="0">
+              <a:solidFill>
+                <a:schemeClr val="bg2"/>
+              </a:solidFill>
+              <a:latin typeface="Raleway ExtraBold" pitchFamily="2" charset="0"/>
+            </a:endParaRPr>
+          </a:p>
+        </p:txBody>
+      </p:sp>
+    </p:spTree>
+    <p:extLst>
+      <p:ext uri="{BB962C8B-B14F-4D97-AF65-F5344CB8AC3E}">
+        <p14:creationId xmlns:p14="http://schemas.microsoft.com/office/powerpoint/2010/main" val="2547003074"/>
+      </p:ext>
+    </p:extLst>
+  </p:cSld>
+  <p:clrMapOvr>
+    <a:masterClrMapping/>
+  </p:clrMapOvr>
+</p:sld>
+</file>
+
+<file path=ppt/slides/slide18.xml><?xml version="1.0" encoding="utf-8"?>
+<p:sld xmlns:a="http://schemas.openxmlformats.org/drawingml/2006/main" xmlns:r="http://schemas.openxmlformats.org/officeDocument/2006/relationships" xmlns:p="http://schemas.openxmlformats.org/presentationml/2006/main">
+  <p:cSld>
+    <p:spTree>
+      <p:nvGrpSpPr>
+        <p:cNvPr id="1" name=""/>
+        <p:cNvGrpSpPr/>
+        <p:nvPr/>
+      </p:nvGrpSpPr>
+      <p:grpSpPr>
+        <a:xfrm>
+          <a:off x="0" y="0"/>
+          <a:ext cx="0" cy="0"/>
+          <a:chOff x="0" y="0"/>
+          <a:chExt cx="0" cy="0"/>
+        </a:xfrm>
+      </p:grpSpPr>
+      <p:sp>
+        <p:nvSpPr>
+          <p:cNvPr id="2" name="Titre 1">
+            <a:extLst>
+              <a:ext uri="{FF2B5EF4-FFF2-40B4-BE49-F238E27FC236}">
+                <a16:creationId xmlns:a16="http://schemas.microsoft.com/office/drawing/2014/main" id="{693DE99D-D7A2-89F5-4CDD-A4230BF00E5E}"/>
+              </a:ext>
+            </a:extLst>
+          </p:cNvPr>
+          <p:cNvSpPr>
+            <a:spLocks noGrp="1"/>
+          </p:cNvSpPr>
+          <p:nvPr>
+            <p:ph type="title"/>
+          </p:nvPr>
+        </p:nvSpPr>
+        <p:spPr/>
+        <p:txBody>
+          <a:bodyPr/>
+          <a:lstStyle/>
+          <a:p>
+            <a:r>
+              <a:rPr lang="fr-FR" dirty="0"/>
+              <a:t>ALI asservi / Modélisation</a:t>
+            </a:r>
+          </a:p>
+        </p:txBody>
+      </p:sp>
+      <p:pic>
+        <p:nvPicPr>
+          <p:cNvPr id="16" name="Image 15">
+            <a:extLst>
+              <a:ext uri="{FF2B5EF4-FFF2-40B4-BE49-F238E27FC236}">
+                <a16:creationId xmlns:a16="http://schemas.microsoft.com/office/drawing/2014/main" id="{1B087254-4552-8D00-0CBC-4A3946417CF9}"/>
+              </a:ext>
+            </a:extLst>
+          </p:cNvPr>
+          <p:cNvPicPr>
+            <a:picLocks noChangeAspect="1"/>
+          </p:cNvPicPr>
+          <p:nvPr/>
+        </p:nvPicPr>
+        <p:blipFill>
+          <a:blip r:embed="rId2"/>
+          <a:stretch>
+            <a:fillRect/>
+          </a:stretch>
+        </p:blipFill>
+        <p:spPr>
+          <a:xfrm>
+            <a:off x="6232249" y="3867886"/>
+            <a:ext cx="4676635" cy="2017950"/>
+          </a:xfrm>
+          <a:prstGeom prst="rect">
+            <a:avLst/>
+          </a:prstGeom>
+        </p:spPr>
+      </p:pic>
+      <p:pic>
+        <p:nvPicPr>
+          <p:cNvPr id="21" name="Image 20">
+            <a:extLst>
+              <a:ext uri="{FF2B5EF4-FFF2-40B4-BE49-F238E27FC236}">
+                <a16:creationId xmlns:a16="http://schemas.microsoft.com/office/drawing/2014/main" id="{7DA19AD2-FEF3-C6A4-6949-81A7BCEFF5C7}"/>
+              </a:ext>
+            </a:extLst>
+          </p:cNvPr>
+          <p:cNvPicPr>
+            <a:picLocks noChangeAspect="1"/>
+          </p:cNvPicPr>
+          <p:nvPr/>
+        </p:nvPicPr>
+        <p:blipFill>
+          <a:blip r:embed="rId3"/>
+          <a:stretch>
+            <a:fillRect/>
+          </a:stretch>
+        </p:blipFill>
+        <p:spPr>
+          <a:xfrm>
+            <a:off x="7165212" y="2315997"/>
+            <a:ext cx="3133725" cy="1247775"/>
+          </a:xfrm>
+          <a:prstGeom prst="rect">
+            <a:avLst/>
+          </a:prstGeom>
+        </p:spPr>
+      </p:pic>
+      <p:pic>
+        <p:nvPicPr>
+          <p:cNvPr id="22" name="Image 21">
+            <a:extLst>
+              <a:ext uri="{FF2B5EF4-FFF2-40B4-BE49-F238E27FC236}">
+                <a16:creationId xmlns:a16="http://schemas.microsoft.com/office/drawing/2014/main" id="{A573B1FB-2E62-BE3A-E7D9-78EACB98AFBD}"/>
+              </a:ext>
+            </a:extLst>
+          </p:cNvPr>
+          <p:cNvPicPr>
+            <a:picLocks noChangeAspect="1"/>
+          </p:cNvPicPr>
+          <p:nvPr/>
+        </p:nvPicPr>
+        <p:blipFill>
+          <a:blip r:embed="rId4"/>
+          <a:stretch>
+            <a:fillRect/>
+          </a:stretch>
+        </p:blipFill>
+        <p:spPr>
+          <a:xfrm>
+            <a:off x="971203" y="2447042"/>
+            <a:ext cx="4133729" cy="3519988"/>
+          </a:xfrm>
+          <a:prstGeom prst="rect">
+            <a:avLst/>
+          </a:prstGeom>
+        </p:spPr>
+      </p:pic>
+      <p:pic>
+        <p:nvPicPr>
+          <p:cNvPr id="23" name="Picture 2" descr="Product Image">
+            <a:extLst>
+              <a:ext uri="{FF2B5EF4-FFF2-40B4-BE49-F238E27FC236}">
+                <a16:creationId xmlns:a16="http://schemas.microsoft.com/office/drawing/2014/main" id="{31B0179D-6F33-B268-9A06-48754004FDF8}"/>
+              </a:ext>
+            </a:extLst>
+          </p:cNvPr>
+          <p:cNvPicPr>
+            <a:picLocks noChangeAspect="1" noChangeArrowheads="1"/>
+          </p:cNvPicPr>
+          <p:nvPr/>
+        </p:nvPicPr>
+        <p:blipFill>
+          <a:blip r:embed="rId5">
+            <a:extLst>
+              <a:ext uri="{28A0092B-C50C-407E-A947-70E740481C1C}">
+                <a14:useLocalDpi xmlns:a14="http://schemas.microsoft.com/office/drawing/2010/main" val="0"/>
+              </a:ext>
+            </a:extLst>
+          </a:blip>
+          <a:srcRect/>
+          <a:stretch>
+            <a:fillRect/>
+          </a:stretch>
+        </p:blipFill>
+        <p:spPr bwMode="auto">
+          <a:xfrm>
+            <a:off x="10281383" y="277955"/>
+            <a:ext cx="1314450" cy="1428750"/>
+          </a:xfrm>
+          <a:prstGeom prst="rect">
+            <a:avLst/>
+          </a:prstGeom>
+          <a:noFill/>
+          <a:extLst>
+            <a:ext uri="{909E8E84-426E-40DD-AFC4-6F175D3DCCD1}">
+              <a14:hiddenFill xmlns:a14="http://schemas.microsoft.com/office/drawing/2010/main">
+                <a:solidFill>
+                  <a:srgbClr val="FFFFFF"/>
+                </a:solidFill>
+              </a14:hiddenFill>
+            </a:ext>
+          </a:extLst>
+        </p:spPr>
+      </p:pic>
+      <p:sp>
+        <p:nvSpPr>
+          <p:cNvPr id="24" name="Rectangle 23">
+            <a:extLst>
+              <a:ext uri="{FF2B5EF4-FFF2-40B4-BE49-F238E27FC236}">
+                <a16:creationId xmlns:a16="http://schemas.microsoft.com/office/drawing/2014/main" id="{6B67B57D-065D-4935-9AFC-8A3AC1F35FF7}"/>
+              </a:ext>
+            </a:extLst>
+          </p:cNvPr>
+          <p:cNvSpPr/>
+          <p:nvPr/>
+        </p:nvSpPr>
+        <p:spPr>
+          <a:xfrm>
+            <a:off x="6511636" y="5742236"/>
+            <a:ext cx="3787301" cy="836855"/>
+          </a:xfrm>
+          <a:prstGeom prst="rect">
+            <a:avLst/>
+          </a:prstGeom>
+          <a:solidFill>
+            <a:srgbClr val="002060"/>
+          </a:solidFill>
+          <a:ln>
+            <a:noFill/>
+          </a:ln>
+        </p:spPr>
+        <p:style>
+          <a:lnRef idx="2">
+            <a:schemeClr val="accent1">
+              <a:shade val="50000"/>
+            </a:schemeClr>
+          </a:lnRef>
+          <a:fillRef idx="1">
+            <a:schemeClr val="accent1"/>
+          </a:fillRef>
+          <a:effectRef idx="0">
+            <a:schemeClr val="accent1"/>
+          </a:effectRef>
+          <a:fontRef idx="minor">
+            <a:schemeClr val="lt1"/>
+          </a:fontRef>
+        </p:style>
+        <p:txBody>
+          <a:bodyPr rtlCol="0" anchor="ctr"/>
+          <a:lstStyle/>
+          <a:p>
+            <a:pPr algn="ctr"/>
+            <a:endParaRPr lang="fr-FR" dirty="0"/>
+          </a:p>
+        </p:txBody>
+      </p:sp>
+      <p:sp>
+        <p:nvSpPr>
+          <p:cNvPr id="25" name="ZoneTexte 24">
+            <a:extLst>
+              <a:ext uri="{FF2B5EF4-FFF2-40B4-BE49-F238E27FC236}">
+                <a16:creationId xmlns:a16="http://schemas.microsoft.com/office/drawing/2014/main" id="{EC472E15-F272-B4AD-880D-EDFF0E975359}"/>
+              </a:ext>
+            </a:extLst>
+          </p:cNvPr>
+          <p:cNvSpPr txBox="1"/>
+          <p:nvPr/>
+        </p:nvSpPr>
+        <p:spPr>
+          <a:xfrm>
+            <a:off x="6834400" y="5924943"/>
+            <a:ext cx="3446983" cy="461665"/>
+          </a:xfrm>
+          <a:prstGeom prst="rect">
+            <a:avLst/>
+          </a:prstGeom>
+          <a:noFill/>
+        </p:spPr>
+        <p:txBody>
+          <a:bodyPr wrap="square">
+            <a:spAutoFit/>
+          </a:bodyPr>
+          <a:lstStyle/>
+          <a:p>
+            <a:r>
+              <a:rPr lang="fr-FR" sz="2400" dirty="0">
+                <a:solidFill>
+                  <a:schemeClr val="bg1"/>
+                </a:solidFill>
+                <a:latin typeface="Interstate" panose="00000400000000000000" pitchFamily="2" charset="0"/>
+              </a:rPr>
+              <a:t>V</a:t>
+            </a:r>
+            <a:r>
+              <a:rPr lang="fr-FR" sz="2400" baseline="-25000" dirty="0">
+                <a:solidFill>
+                  <a:schemeClr val="bg1"/>
+                </a:solidFill>
+                <a:latin typeface="Interstate" panose="00000400000000000000" pitchFamily="2" charset="0"/>
+              </a:rPr>
+              <a:t>S</a:t>
+            </a:r>
+            <a:r>
+              <a:rPr lang="fr-FR" sz="2400" dirty="0">
+                <a:solidFill>
+                  <a:schemeClr val="bg1"/>
+                </a:solidFill>
+                <a:latin typeface="Interstate" panose="00000400000000000000" pitchFamily="2" charset="0"/>
+              </a:rPr>
+              <a:t> =                                   V</a:t>
+            </a:r>
+            <a:r>
+              <a:rPr lang="fr-FR" sz="2400" baseline="-25000" dirty="0">
+                <a:solidFill>
+                  <a:schemeClr val="bg1"/>
+                </a:solidFill>
+                <a:latin typeface="Interstate" panose="00000400000000000000" pitchFamily="2" charset="0"/>
+              </a:rPr>
+              <a:t>E</a:t>
+            </a:r>
+            <a:endParaRPr lang="fr-FR" sz="2400" baseline="-25000" dirty="0">
+              <a:solidFill>
+                <a:schemeClr val="bg1"/>
+              </a:solidFill>
+            </a:endParaRPr>
+          </a:p>
+        </p:txBody>
+      </p:sp>
+      <p:sp>
+        <p:nvSpPr>
+          <p:cNvPr id="26" name="ZoneTexte 25">
+            <a:extLst>
+              <a:ext uri="{FF2B5EF4-FFF2-40B4-BE49-F238E27FC236}">
+                <a16:creationId xmlns:a16="http://schemas.microsoft.com/office/drawing/2014/main" id="{8ACD02D5-2098-20F8-070E-DFCD845DE78B}"/>
+              </a:ext>
+            </a:extLst>
+          </p:cNvPr>
+          <p:cNvSpPr txBox="1"/>
+          <p:nvPr/>
+        </p:nvSpPr>
+        <p:spPr>
+          <a:xfrm>
+            <a:off x="7111166" y="5739622"/>
+            <a:ext cx="2818155" cy="830997"/>
+          </a:xfrm>
+          <a:prstGeom prst="rect">
+            <a:avLst/>
+          </a:prstGeom>
+          <a:noFill/>
+        </p:spPr>
+        <p:txBody>
+          <a:bodyPr wrap="square">
+            <a:spAutoFit/>
+          </a:bodyPr>
+          <a:lstStyle/>
+          <a:p>
+            <a:pPr algn="ctr"/>
+            <a:r>
+              <a:rPr lang="fr-FR" sz="2400" dirty="0">
+                <a:solidFill>
+                  <a:schemeClr val="accent2"/>
+                </a:solidFill>
+                <a:latin typeface="Interstate" panose="00000400000000000000" pitchFamily="2" charset="0"/>
+              </a:rPr>
+              <a:t>A(j</a:t>
+            </a:r>
+            <a:r>
+              <a:rPr lang="el-GR" sz="2400" dirty="0">
+                <a:solidFill>
+                  <a:schemeClr val="accent2"/>
+                </a:solidFill>
+                <a:latin typeface="Arial" panose="020B0604020202020204" pitchFamily="34" charset="0"/>
+                <a:cs typeface="Arial" panose="020B0604020202020204" pitchFamily="34" charset="0"/>
+              </a:rPr>
+              <a:t>ω</a:t>
+            </a:r>
+            <a:r>
+              <a:rPr lang="fr-FR" sz="2400" dirty="0">
+                <a:solidFill>
+                  <a:schemeClr val="accent2"/>
+                </a:solidFill>
+                <a:latin typeface="Interstate" panose="00000400000000000000" pitchFamily="2" charset="0"/>
+              </a:rPr>
+              <a:t>)</a:t>
+            </a:r>
+          </a:p>
+          <a:p>
+            <a:pPr algn="ctr"/>
+            <a:r>
+              <a:rPr lang="fr-FR" sz="2400" dirty="0">
+                <a:solidFill>
+                  <a:schemeClr val="bg1"/>
+                </a:solidFill>
+                <a:latin typeface="Interstate" panose="00000400000000000000" pitchFamily="2" charset="0"/>
+              </a:rPr>
+              <a:t>1 + </a:t>
+            </a:r>
+            <a:r>
+              <a:rPr lang="fr-FR" sz="2400" dirty="0">
+                <a:solidFill>
+                  <a:schemeClr val="accent2"/>
+                </a:solidFill>
+                <a:latin typeface="Interstate" panose="00000400000000000000" pitchFamily="2" charset="0"/>
+              </a:rPr>
+              <a:t>A(j</a:t>
+            </a:r>
+            <a:r>
+              <a:rPr lang="el-GR" sz="2400" dirty="0">
+                <a:solidFill>
+                  <a:schemeClr val="accent2"/>
+                </a:solidFill>
+                <a:latin typeface="Arial" panose="020B0604020202020204" pitchFamily="34" charset="0"/>
+                <a:cs typeface="Arial" panose="020B0604020202020204" pitchFamily="34" charset="0"/>
+              </a:rPr>
+              <a:t>ω</a:t>
+            </a:r>
+            <a:r>
+              <a:rPr lang="fr-FR" sz="2400" dirty="0">
+                <a:solidFill>
+                  <a:schemeClr val="accent2"/>
+                </a:solidFill>
+                <a:latin typeface="Interstate" panose="00000400000000000000" pitchFamily="2" charset="0"/>
+              </a:rPr>
+              <a:t>) </a:t>
+            </a:r>
+            <a:r>
+              <a:rPr lang="fr-FR" sz="2400" dirty="0">
+                <a:solidFill>
+                  <a:schemeClr val="bg1"/>
+                </a:solidFill>
+                <a:latin typeface="Interstate" panose="00000400000000000000" pitchFamily="2" charset="0"/>
+              </a:rPr>
+              <a:t>.</a:t>
+            </a:r>
+            <a:r>
+              <a:rPr lang="fr-FR" sz="2400" dirty="0">
+                <a:solidFill>
+                  <a:schemeClr val="accent2"/>
+                </a:solidFill>
+                <a:latin typeface="Interstate" panose="00000400000000000000" pitchFamily="2" charset="0"/>
+              </a:rPr>
+              <a:t> </a:t>
+            </a:r>
+            <a:r>
+              <a:rPr lang="fr-FR" sz="2400" dirty="0">
+                <a:solidFill>
+                  <a:schemeClr val="accent1"/>
+                </a:solidFill>
+                <a:latin typeface="Interstate" panose="00000400000000000000" pitchFamily="2" charset="0"/>
+              </a:rPr>
+              <a:t>B(j</a:t>
+            </a:r>
+            <a:r>
+              <a:rPr lang="el-GR" sz="2400" dirty="0">
+                <a:solidFill>
+                  <a:schemeClr val="accent1"/>
+                </a:solidFill>
+                <a:latin typeface="Arial" panose="020B0604020202020204" pitchFamily="34" charset="0"/>
+                <a:cs typeface="Arial" panose="020B0604020202020204" pitchFamily="34" charset="0"/>
+              </a:rPr>
+              <a:t>ω</a:t>
+            </a:r>
+            <a:r>
+              <a:rPr lang="fr-FR" sz="2400" dirty="0">
+                <a:solidFill>
+                  <a:schemeClr val="accent1"/>
+                </a:solidFill>
+                <a:latin typeface="Interstate" panose="00000400000000000000" pitchFamily="2" charset="0"/>
+              </a:rPr>
+              <a:t>)</a:t>
+            </a:r>
+            <a:endParaRPr lang="fr-FR" sz="2400" dirty="0">
+              <a:solidFill>
+                <a:schemeClr val="accent1"/>
+              </a:solidFill>
+            </a:endParaRPr>
+          </a:p>
+        </p:txBody>
+      </p:sp>
+      <p:cxnSp>
+        <p:nvCxnSpPr>
+          <p:cNvPr id="27" name="Connecteur droit 26">
+            <a:extLst>
+              <a:ext uri="{FF2B5EF4-FFF2-40B4-BE49-F238E27FC236}">
+                <a16:creationId xmlns:a16="http://schemas.microsoft.com/office/drawing/2014/main" id="{B6023E43-94AE-A7F0-6501-5334CA0961C9}"/>
+              </a:ext>
+            </a:extLst>
+          </p:cNvPr>
+          <p:cNvCxnSpPr>
+            <a:cxnSpLocks/>
+          </p:cNvCxnSpPr>
+          <p:nvPr/>
+        </p:nvCxnSpPr>
+        <p:spPr>
+          <a:xfrm>
+            <a:off x="7499927" y="6155120"/>
+            <a:ext cx="2179782" cy="0"/>
+          </a:xfrm>
+          <a:prstGeom prst="line">
+            <a:avLst/>
+          </a:prstGeom>
+          <a:ln w="28575">
+            <a:solidFill>
+              <a:schemeClr val="bg1"/>
+            </a:solidFill>
+          </a:ln>
+        </p:spPr>
+        <p:style>
+          <a:lnRef idx="1">
+            <a:schemeClr val="accent1"/>
+          </a:lnRef>
+          <a:fillRef idx="0">
+            <a:schemeClr val="accent1"/>
+          </a:fillRef>
+          <a:effectRef idx="0">
+            <a:schemeClr val="accent1"/>
+          </a:effectRef>
+          <a:fontRef idx="minor">
+            <a:schemeClr val="tx1"/>
+          </a:fontRef>
+        </p:style>
+      </p:cxnSp>
+    </p:spTree>
+    <p:extLst>
+      <p:ext uri="{BB962C8B-B14F-4D97-AF65-F5344CB8AC3E}">
+        <p14:creationId xmlns:p14="http://schemas.microsoft.com/office/powerpoint/2010/main" val="3624075755"/>
+      </p:ext>
+    </p:extLst>
+  </p:cSld>
+  <p:clrMapOvr>
+    <a:masterClrMapping/>
+  </p:clrMapOvr>
+</p:sld>
+</file>
+
+<file path=ppt/slides/slide19.xml><?xml version="1.0" encoding="utf-8"?>
+<p:sld xmlns:a="http://schemas.openxmlformats.org/drawingml/2006/main" xmlns:r="http://schemas.openxmlformats.org/officeDocument/2006/relationships" xmlns:p="http://schemas.openxmlformats.org/presentationml/2006/main">
+  <p:cSld>
+    <p:spTree>
+      <p:nvGrpSpPr>
+        <p:cNvPr id="1" name=""/>
+        <p:cNvGrpSpPr/>
+        <p:nvPr/>
+      </p:nvGrpSpPr>
+      <p:grpSpPr>
+        <a:xfrm>
+          <a:off x="0" y="0"/>
+          <a:ext cx="0" cy="0"/>
+          <a:chOff x="0" y="0"/>
+          <a:chExt cx="0" cy="0"/>
+        </a:xfrm>
+      </p:grpSpPr>
+      <p:sp>
+        <p:nvSpPr>
+          <p:cNvPr id="2" name="Titre 1">
+            <a:extLst>
+              <a:ext uri="{FF2B5EF4-FFF2-40B4-BE49-F238E27FC236}">
+                <a16:creationId xmlns:a16="http://schemas.microsoft.com/office/drawing/2014/main" id="{693DE99D-D7A2-89F5-4CDD-A4230BF00E5E}"/>
+              </a:ext>
+            </a:extLst>
+          </p:cNvPr>
+          <p:cNvSpPr>
+            <a:spLocks noGrp="1"/>
+          </p:cNvSpPr>
+          <p:nvPr>
+            <p:ph type="title"/>
+          </p:nvPr>
+        </p:nvSpPr>
+        <p:spPr/>
+        <p:txBody>
+          <a:bodyPr/>
+          <a:lstStyle/>
+          <a:p>
+            <a:r>
+              <a:rPr lang="fr-FR" dirty="0" err="1"/>
+              <a:t>Transimpédance</a:t>
+            </a:r>
+            <a:r>
+              <a:rPr lang="fr-FR" dirty="0"/>
+              <a:t> / Modélisation</a:t>
+            </a:r>
+          </a:p>
+        </p:txBody>
+      </p:sp>
+      <p:pic>
+        <p:nvPicPr>
+          <p:cNvPr id="14" name="Image 13">
+            <a:extLst>
+              <a:ext uri="{FF2B5EF4-FFF2-40B4-BE49-F238E27FC236}">
+                <a16:creationId xmlns:a16="http://schemas.microsoft.com/office/drawing/2014/main" id="{FD52B9BF-1485-2EDF-C915-008C1BCF3976}"/>
+              </a:ext>
+            </a:extLst>
+          </p:cNvPr>
+          <p:cNvPicPr>
+            <a:picLocks noChangeAspect="1"/>
+          </p:cNvPicPr>
+          <p:nvPr/>
+        </p:nvPicPr>
+        <p:blipFill>
+          <a:blip r:embed="rId2"/>
+          <a:stretch>
+            <a:fillRect/>
+          </a:stretch>
+        </p:blipFill>
+        <p:spPr>
+          <a:xfrm>
+            <a:off x="1521809" y="2358218"/>
+            <a:ext cx="9001125" cy="2381250"/>
+          </a:xfrm>
+          <a:prstGeom prst="rect">
+            <a:avLst/>
+          </a:prstGeom>
+        </p:spPr>
+      </p:pic>
+      <p:pic>
+        <p:nvPicPr>
+          <p:cNvPr id="15" name="Image 14">
+            <a:extLst>
+              <a:ext uri="{FF2B5EF4-FFF2-40B4-BE49-F238E27FC236}">
+                <a16:creationId xmlns:a16="http://schemas.microsoft.com/office/drawing/2014/main" id="{AF14E868-D5E2-EF35-DE42-FD1C0B62EC35}"/>
+              </a:ext>
+            </a:extLst>
+          </p:cNvPr>
+          <p:cNvPicPr>
+            <a:picLocks noChangeAspect="1"/>
+          </p:cNvPicPr>
+          <p:nvPr/>
+        </p:nvPicPr>
+        <p:blipFill>
+          <a:blip r:embed="rId3"/>
+          <a:stretch>
+            <a:fillRect/>
+          </a:stretch>
+        </p:blipFill>
+        <p:spPr>
+          <a:xfrm>
+            <a:off x="1001954" y="4975807"/>
+            <a:ext cx="4571269" cy="1373025"/>
+          </a:xfrm>
+          <a:prstGeom prst="rect">
+            <a:avLst/>
+          </a:prstGeom>
+        </p:spPr>
+      </p:pic>
+      <p:sp>
+        <p:nvSpPr>
+          <p:cNvPr id="3" name="Rectangle 2">
+            <a:extLst>
+              <a:ext uri="{FF2B5EF4-FFF2-40B4-BE49-F238E27FC236}">
+                <a16:creationId xmlns:a16="http://schemas.microsoft.com/office/drawing/2014/main" id="{A4DC9B00-0673-3736-AE6C-723ABE63E8F7}"/>
+              </a:ext>
+            </a:extLst>
+          </p:cNvPr>
+          <p:cNvSpPr/>
+          <p:nvPr/>
+        </p:nvSpPr>
+        <p:spPr>
+          <a:xfrm>
+            <a:off x="6511636" y="5742236"/>
+            <a:ext cx="3787301" cy="836855"/>
+          </a:xfrm>
+          <a:prstGeom prst="rect">
+            <a:avLst/>
+          </a:prstGeom>
+          <a:solidFill>
+            <a:srgbClr val="002060"/>
+          </a:solidFill>
+          <a:ln>
+            <a:noFill/>
+          </a:ln>
+        </p:spPr>
+        <p:style>
+          <a:lnRef idx="2">
+            <a:schemeClr val="accent1">
+              <a:shade val="50000"/>
+            </a:schemeClr>
+          </a:lnRef>
+          <a:fillRef idx="1">
+            <a:schemeClr val="accent1"/>
+          </a:fillRef>
+          <a:effectRef idx="0">
+            <a:schemeClr val="accent1"/>
+          </a:effectRef>
+          <a:fontRef idx="minor">
+            <a:schemeClr val="lt1"/>
+          </a:fontRef>
+        </p:style>
+        <p:txBody>
+          <a:bodyPr rtlCol="0" anchor="ctr"/>
+          <a:lstStyle/>
+          <a:p>
+            <a:pPr algn="ctr"/>
+            <a:endParaRPr lang="fr-FR" dirty="0"/>
+          </a:p>
+        </p:txBody>
+      </p:sp>
+      <p:sp>
+        <p:nvSpPr>
+          <p:cNvPr id="4" name="ZoneTexte 3">
+            <a:extLst>
+              <a:ext uri="{FF2B5EF4-FFF2-40B4-BE49-F238E27FC236}">
+                <a16:creationId xmlns:a16="http://schemas.microsoft.com/office/drawing/2014/main" id="{8C093102-442D-68F5-8722-1B22A1C71937}"/>
+              </a:ext>
+            </a:extLst>
+          </p:cNvPr>
+          <p:cNvSpPr txBox="1"/>
+          <p:nvPr/>
+        </p:nvSpPr>
+        <p:spPr>
+          <a:xfrm>
+            <a:off x="6834400" y="5924943"/>
+            <a:ext cx="3446983" cy="461665"/>
+          </a:xfrm>
+          <a:prstGeom prst="rect">
+            <a:avLst/>
+          </a:prstGeom>
+          <a:noFill/>
+        </p:spPr>
+        <p:txBody>
+          <a:bodyPr wrap="square">
+            <a:spAutoFit/>
+          </a:bodyPr>
+          <a:lstStyle/>
+          <a:p>
+            <a:r>
+              <a:rPr lang="fr-FR" sz="2400" dirty="0">
+                <a:solidFill>
+                  <a:schemeClr val="bg1"/>
+                </a:solidFill>
+                <a:latin typeface="Interstate" panose="00000400000000000000" pitchFamily="2" charset="0"/>
+              </a:rPr>
+              <a:t>V</a:t>
+            </a:r>
+            <a:r>
+              <a:rPr lang="fr-FR" sz="2400" baseline="-25000" dirty="0">
+                <a:solidFill>
+                  <a:schemeClr val="bg1"/>
+                </a:solidFill>
+                <a:latin typeface="Interstate" panose="00000400000000000000" pitchFamily="2" charset="0"/>
+              </a:rPr>
+              <a:t>S</a:t>
+            </a:r>
+            <a:r>
+              <a:rPr lang="fr-FR" sz="2400" dirty="0">
+                <a:solidFill>
+                  <a:schemeClr val="bg1"/>
+                </a:solidFill>
+                <a:latin typeface="Interstate" panose="00000400000000000000" pitchFamily="2" charset="0"/>
+              </a:rPr>
+              <a:t> =                                   V</a:t>
+            </a:r>
+            <a:r>
+              <a:rPr lang="fr-FR" sz="2400" baseline="-25000" dirty="0">
+                <a:solidFill>
+                  <a:schemeClr val="bg1"/>
+                </a:solidFill>
+                <a:latin typeface="Interstate" panose="00000400000000000000" pitchFamily="2" charset="0"/>
+              </a:rPr>
+              <a:t>E</a:t>
+            </a:r>
+            <a:endParaRPr lang="fr-FR" sz="2400" baseline="-25000" dirty="0">
+              <a:solidFill>
+                <a:schemeClr val="bg1"/>
+              </a:solidFill>
+            </a:endParaRPr>
+          </a:p>
+        </p:txBody>
+      </p:sp>
+      <p:sp>
+        <p:nvSpPr>
+          <p:cNvPr id="5" name="ZoneTexte 4">
+            <a:extLst>
+              <a:ext uri="{FF2B5EF4-FFF2-40B4-BE49-F238E27FC236}">
+                <a16:creationId xmlns:a16="http://schemas.microsoft.com/office/drawing/2014/main" id="{459D6645-2294-2AB1-7BB1-F3E3B6E1794A}"/>
+              </a:ext>
+            </a:extLst>
+          </p:cNvPr>
+          <p:cNvSpPr txBox="1"/>
+          <p:nvPr/>
+        </p:nvSpPr>
+        <p:spPr>
+          <a:xfrm>
+            <a:off x="7111166" y="5739622"/>
+            <a:ext cx="2818155" cy="830997"/>
+          </a:xfrm>
+          <a:prstGeom prst="rect">
+            <a:avLst/>
+          </a:prstGeom>
+          <a:noFill/>
+        </p:spPr>
+        <p:txBody>
+          <a:bodyPr wrap="square">
+            <a:spAutoFit/>
+          </a:bodyPr>
+          <a:lstStyle/>
+          <a:p>
+            <a:pPr algn="ctr"/>
+            <a:r>
+              <a:rPr lang="fr-FR" sz="2400" dirty="0">
+                <a:solidFill>
+                  <a:schemeClr val="accent2"/>
+                </a:solidFill>
+                <a:latin typeface="Interstate" panose="00000400000000000000" pitchFamily="2" charset="0"/>
+              </a:rPr>
+              <a:t>A(j</a:t>
+            </a:r>
+            <a:r>
+              <a:rPr lang="el-GR" sz="2400" dirty="0">
+                <a:solidFill>
+                  <a:schemeClr val="accent2"/>
+                </a:solidFill>
+                <a:latin typeface="Arial" panose="020B0604020202020204" pitchFamily="34" charset="0"/>
+                <a:cs typeface="Arial" panose="020B0604020202020204" pitchFamily="34" charset="0"/>
+              </a:rPr>
+              <a:t>ω</a:t>
+            </a:r>
+            <a:r>
+              <a:rPr lang="fr-FR" sz="2400" dirty="0">
+                <a:solidFill>
+                  <a:schemeClr val="accent2"/>
+                </a:solidFill>
+                <a:latin typeface="Interstate" panose="00000400000000000000" pitchFamily="2" charset="0"/>
+              </a:rPr>
+              <a:t>)</a:t>
+            </a:r>
+          </a:p>
+          <a:p>
+            <a:pPr algn="ctr"/>
+            <a:r>
+              <a:rPr lang="fr-FR" sz="2400" dirty="0">
+                <a:solidFill>
+                  <a:schemeClr val="bg1"/>
+                </a:solidFill>
+                <a:latin typeface="Interstate" panose="00000400000000000000" pitchFamily="2" charset="0"/>
+              </a:rPr>
+              <a:t>1 + </a:t>
+            </a:r>
+            <a:r>
+              <a:rPr lang="fr-FR" sz="2400" dirty="0">
+                <a:solidFill>
+                  <a:schemeClr val="accent2"/>
+                </a:solidFill>
+                <a:latin typeface="Interstate" panose="00000400000000000000" pitchFamily="2" charset="0"/>
+              </a:rPr>
+              <a:t>A(j</a:t>
+            </a:r>
+            <a:r>
+              <a:rPr lang="el-GR" sz="2400" dirty="0">
+                <a:solidFill>
+                  <a:schemeClr val="accent2"/>
+                </a:solidFill>
+                <a:latin typeface="Arial" panose="020B0604020202020204" pitchFamily="34" charset="0"/>
+                <a:cs typeface="Arial" panose="020B0604020202020204" pitchFamily="34" charset="0"/>
+              </a:rPr>
+              <a:t>ω</a:t>
+            </a:r>
+            <a:r>
+              <a:rPr lang="fr-FR" sz="2400" dirty="0">
+                <a:solidFill>
+                  <a:schemeClr val="accent2"/>
+                </a:solidFill>
+                <a:latin typeface="Interstate" panose="00000400000000000000" pitchFamily="2" charset="0"/>
+              </a:rPr>
+              <a:t>) </a:t>
+            </a:r>
+            <a:r>
+              <a:rPr lang="fr-FR" sz="2400" dirty="0">
+                <a:solidFill>
+                  <a:schemeClr val="bg1"/>
+                </a:solidFill>
+                <a:latin typeface="Interstate" panose="00000400000000000000" pitchFamily="2" charset="0"/>
+              </a:rPr>
+              <a:t>.</a:t>
+            </a:r>
+            <a:r>
+              <a:rPr lang="fr-FR" sz="2400" dirty="0">
+                <a:solidFill>
+                  <a:schemeClr val="accent2"/>
+                </a:solidFill>
+                <a:latin typeface="Interstate" panose="00000400000000000000" pitchFamily="2" charset="0"/>
+              </a:rPr>
+              <a:t> </a:t>
+            </a:r>
+            <a:r>
+              <a:rPr lang="fr-FR" sz="2400" dirty="0">
+                <a:solidFill>
+                  <a:schemeClr val="accent1"/>
+                </a:solidFill>
+                <a:latin typeface="Interstate" panose="00000400000000000000" pitchFamily="2" charset="0"/>
+              </a:rPr>
+              <a:t>B(j</a:t>
+            </a:r>
+            <a:r>
+              <a:rPr lang="el-GR" sz="2400" dirty="0">
+                <a:solidFill>
+                  <a:schemeClr val="accent1"/>
+                </a:solidFill>
+                <a:latin typeface="Arial" panose="020B0604020202020204" pitchFamily="34" charset="0"/>
+                <a:cs typeface="Arial" panose="020B0604020202020204" pitchFamily="34" charset="0"/>
+              </a:rPr>
+              <a:t>ω</a:t>
+            </a:r>
+            <a:r>
+              <a:rPr lang="fr-FR" sz="2400" dirty="0">
+                <a:solidFill>
+                  <a:schemeClr val="accent1"/>
+                </a:solidFill>
+                <a:latin typeface="Interstate" panose="00000400000000000000" pitchFamily="2" charset="0"/>
+              </a:rPr>
+              <a:t>)</a:t>
+            </a:r>
+            <a:endParaRPr lang="fr-FR" sz="2400" dirty="0">
+              <a:solidFill>
+                <a:schemeClr val="accent1"/>
+              </a:solidFill>
+            </a:endParaRPr>
+          </a:p>
+        </p:txBody>
+      </p:sp>
+      <p:cxnSp>
+        <p:nvCxnSpPr>
+          <p:cNvPr id="6" name="Connecteur droit 5">
+            <a:extLst>
+              <a:ext uri="{FF2B5EF4-FFF2-40B4-BE49-F238E27FC236}">
+                <a16:creationId xmlns:a16="http://schemas.microsoft.com/office/drawing/2014/main" id="{C6CF3293-420D-983E-2BFE-0C185DB5EF66}"/>
+              </a:ext>
+            </a:extLst>
+          </p:cNvPr>
+          <p:cNvCxnSpPr>
+            <a:cxnSpLocks/>
+          </p:cNvCxnSpPr>
+          <p:nvPr/>
+        </p:nvCxnSpPr>
+        <p:spPr>
+          <a:xfrm>
+            <a:off x="7499927" y="6155120"/>
+            <a:ext cx="2179782" cy="0"/>
+          </a:xfrm>
+          <a:prstGeom prst="line">
+            <a:avLst/>
+          </a:prstGeom>
+          <a:ln w="28575">
+            <a:solidFill>
+              <a:schemeClr val="bg1"/>
+            </a:solidFill>
+          </a:ln>
+        </p:spPr>
+        <p:style>
+          <a:lnRef idx="1">
+            <a:schemeClr val="accent1"/>
+          </a:lnRef>
+          <a:fillRef idx="0">
+            <a:schemeClr val="accent1"/>
+          </a:fillRef>
+          <a:effectRef idx="0">
+            <a:schemeClr val="accent1"/>
+          </a:effectRef>
+          <a:fontRef idx="minor">
+            <a:schemeClr val="tx1"/>
+          </a:fontRef>
+        </p:style>
+      </p:cxnSp>
+    </p:spTree>
+    <p:extLst>
+      <p:ext uri="{BB962C8B-B14F-4D97-AF65-F5344CB8AC3E}">
+        <p14:creationId xmlns:p14="http://schemas.microsoft.com/office/powerpoint/2010/main" val="618443482"/>
+      </p:ext>
+    </p:extLst>
+  </p:cSld>
+  <p:clrMapOvr>
+    <a:masterClrMapping/>
   </p:clrMapOvr>
 </p:sld>
 </file>

</xml_diff>